<commit_message>
Fixed emojis, added some more
</commit_message>
<xml_diff>
--- a/comm-and-doc-arch-decisions.pptx
+++ b/comm-and-doc-arch-decisions.pptx
@@ -5,7 +5,7 @@
     <p:sldMasterId id="2147483648" r:id="rId1"/>
   </p:sldMasterIdLst>
   <p:notesMasterIdLst>
-    <p:notesMasterId r:id="rId70"/>
+    <p:notesMasterId r:id="rId69"/>
   </p:notesMasterIdLst>
   <p:sldIdLst>
     <p:sldId id="256" r:id="rId2"/>
@@ -56,26 +56,25 @@
     <p:sldId id="321" r:id="rId47"/>
     <p:sldId id="322" r:id="rId48"/>
     <p:sldId id="323" r:id="rId49"/>
-    <p:sldId id="324" r:id="rId50"/>
-    <p:sldId id="325" r:id="rId51"/>
-    <p:sldId id="326" r:id="rId52"/>
-    <p:sldId id="327" r:id="rId53"/>
-    <p:sldId id="328" r:id="rId54"/>
-    <p:sldId id="329" r:id="rId55"/>
-    <p:sldId id="330" r:id="rId56"/>
-    <p:sldId id="331" r:id="rId57"/>
-    <p:sldId id="332" r:id="rId58"/>
-    <p:sldId id="333" r:id="rId59"/>
-    <p:sldId id="334" r:id="rId60"/>
-    <p:sldId id="335" r:id="rId61"/>
-    <p:sldId id="336" r:id="rId62"/>
-    <p:sldId id="337" r:id="rId63"/>
-    <p:sldId id="338" r:id="rId64"/>
-    <p:sldId id="339" r:id="rId65"/>
-    <p:sldId id="340" r:id="rId66"/>
-    <p:sldId id="372" r:id="rId67"/>
-    <p:sldId id="373" r:id="rId68"/>
-    <p:sldId id="374" r:id="rId69"/>
+    <p:sldId id="325" r:id="rId50"/>
+    <p:sldId id="326" r:id="rId51"/>
+    <p:sldId id="327" r:id="rId52"/>
+    <p:sldId id="328" r:id="rId53"/>
+    <p:sldId id="329" r:id="rId54"/>
+    <p:sldId id="330" r:id="rId55"/>
+    <p:sldId id="331" r:id="rId56"/>
+    <p:sldId id="332" r:id="rId57"/>
+    <p:sldId id="333" r:id="rId58"/>
+    <p:sldId id="334" r:id="rId59"/>
+    <p:sldId id="335" r:id="rId60"/>
+    <p:sldId id="336" r:id="rId61"/>
+    <p:sldId id="337" r:id="rId62"/>
+    <p:sldId id="338" r:id="rId63"/>
+    <p:sldId id="339" r:id="rId64"/>
+    <p:sldId id="340" r:id="rId65"/>
+    <p:sldId id="372" r:id="rId66"/>
+    <p:sldId id="373" r:id="rId67"/>
+    <p:sldId id="374" r:id="rId68"/>
   </p:sldIdLst>
   <p:sldSz cx="12192000" cy="6858000"/>
   <p:notesSz cx="6858000" cy="9144000"/>
@@ -934,7 +933,7 @@
           <a:p>
             <a:fld id="{6525C509-FCE7-1E4E-BABF-F948CC4246E2}" type="datetimeFigureOut">
               <a:rPr lang="en-US" smtClean="0"/>
-              <a:t>4/4/2019</a:t>
+              <a:t>4/9/2019</a:t>
             </a:fld>
             <a:endParaRPr lang="en-US"/>
           </a:p>
@@ -6369,7 +6368,7 @@
                 <a:ea typeface="+mn-ea"/>
                 <a:cs typeface="+mn-cs"/>
               </a:rPr>
-              <a:t>These SIGs are great places to embed Enterprise Architecture folks, especially as it related to reference implementations. I'll talk about this more later, but this is a great opportunity for Enterprise Architects to jump back into the pool and swim around a bit, flexing those practitioner muscles.</a:t>
+              <a:t>Instead of an "Architecture Review Board", architectural decisions were brought before the guild for discussion and adoption. The Guild had "high ranking" technology folks, so if it was ever necessary for someone to serve as a tiebreaker, they were there to do that. But it almost never came down to it. As I said earlier, people generally make good decisions, and when it comes down to it, people want the best for the company and the environment that they work in day-to-day.</a:t>
             </a:r>
             <a:endParaRPr lang="en-US" b="0" dirty="0">
               <a:effectLst/>
@@ -6403,7 +6402,7 @@
     </p:spTree>
     <p:extLst>
       <p:ext uri="{BB962C8B-B14F-4D97-AF65-F5344CB8AC3E}">
-        <p14:creationId xmlns:p14="http://schemas.microsoft.com/office/powerpoint/2010/main" val="2038792693"/>
+        <p14:creationId xmlns:p14="http://schemas.microsoft.com/office/powerpoint/2010/main" val="2728671387"/>
       </p:ext>
     </p:extLst>
   </p:cSld>
@@ -6619,7 +6618,7 @@
                 <a:ea typeface="+mn-ea"/>
                 <a:cs typeface="+mn-cs"/>
               </a:rPr>
-              <a:t>Instead of an "Architecture Review Board", architectural decisions were brought before the guild for discussion and adoption. The Guild had "high ranking" technology folks, so if it was ever necessary for someone to serve as a tiebreaker, they were there to do that. But it almost never came down to it. As I said earlier, people generally make good decisions, and when it comes down to it, people want the best for the company and the environment that they work in day-to-day.</a:t>
+              <a:t>The guild also served another important purpose. The participants really felt like they were helping form the Architecture for the Enterprise, and they became evangelists, spreading the word to their peers about the decisions that were being made. It wasn't a silver bullet to socialize decisions, but it helped a lot. The guild would also present on a regular basis at our "all-hands" meetings, covering important topics, new decisions, reminders of best practices, etc.</a:t>
             </a:r>
             <a:endParaRPr lang="en-US" b="0" dirty="0">
               <a:effectLst/>
@@ -6653,7 +6652,7 @@
     </p:spTree>
     <p:extLst>
       <p:ext uri="{BB962C8B-B14F-4D97-AF65-F5344CB8AC3E}">
-        <p14:creationId xmlns:p14="http://schemas.microsoft.com/office/powerpoint/2010/main" val="2728671387"/>
+        <p14:creationId xmlns:p14="http://schemas.microsoft.com/office/powerpoint/2010/main" val="3948155629"/>
       </p:ext>
     </p:extLst>
   </p:cSld>
@@ -6723,7 +6722,7 @@
                 <a:ea typeface="+mn-ea"/>
                 <a:cs typeface="+mn-cs"/>
               </a:rPr>
-              <a:t>The guild also served another important purpose. The participants really felt like they were helping form the Architecture for the Enterprise, and they became evangelists, spreading the word to their peers about the decisions that were being made. It wasn't a silver bullet to socialize decisions, but it helped a lot. The guild would also present on a regular basis at our "all-hands" meetings, covering important topics, new decisions, reminders of best practices, etc.</a:t>
+              <a:t>Each guild meeting started with a set agenda</a:t>
             </a:r>
             <a:endParaRPr lang="en-US" b="0" dirty="0">
               <a:effectLst/>
@@ -6757,7 +6756,7 @@
     </p:spTree>
     <p:extLst>
       <p:ext uri="{BB962C8B-B14F-4D97-AF65-F5344CB8AC3E}">
-        <p14:creationId xmlns:p14="http://schemas.microsoft.com/office/powerpoint/2010/main" val="3948155629"/>
+        <p14:creationId xmlns:p14="http://schemas.microsoft.com/office/powerpoint/2010/main" val="1617754801"/>
       </p:ext>
     </p:extLst>
   </p:cSld>
@@ -6827,7 +6826,34 @@
                 <a:ea typeface="+mn-ea"/>
                 <a:cs typeface="+mn-cs"/>
               </a:rPr>
-              <a:t>Each guild meeting started with a set agenda</a:t>
+              <a:t>This open discussion time often proved to be the most interesting. Someone would bring up a topic that applied to the Guild, and there would be lively discussion and debate, often ending with action items delegated to an existing SIG, or the formation of a new, short-term SIG.</a:t>
+            </a:r>
+          </a:p>
+          <a:p>
+            <a:pPr rtl="0"/>
+            <a:endParaRPr lang="en-US" sz="1200" b="0" i="0" u="none" strike="noStrike" kern="1200" dirty="0">
+              <a:solidFill>
+                <a:schemeClr val="tx1"/>
+              </a:solidFill>
+              <a:effectLst/>
+              <a:latin typeface="+mn-lt"/>
+              <a:ea typeface="+mn-ea"/>
+              <a:cs typeface="+mn-cs"/>
+            </a:endParaRPr>
+          </a:p>
+          <a:p>
+            <a:pPr rtl="0"/>
+            <a:r>
+              <a:rPr lang="en-US" sz="1200" b="0" i="0" u="none" strike="noStrike" kern="1200" dirty="0">
+                <a:solidFill>
+                  <a:schemeClr val="tx1"/>
+                </a:solidFill>
+                <a:effectLst/>
+                <a:latin typeface="+mn-lt"/>
+                <a:ea typeface="+mn-ea"/>
+                <a:cs typeface="+mn-cs"/>
+              </a:rPr>
+              <a:t>All in all, the Enterprise Architecture guild proved to be a powerful tool to help bring some order to a potentially chaotic world.</a:t>
             </a:r>
             <a:endParaRPr lang="en-US" b="0" dirty="0">
               <a:effectLst/>
@@ -6861,7 +6887,7 @@
     </p:spTree>
     <p:extLst>
       <p:ext uri="{BB962C8B-B14F-4D97-AF65-F5344CB8AC3E}">
-        <p14:creationId xmlns:p14="http://schemas.microsoft.com/office/powerpoint/2010/main" val="1617754801"/>
+        <p14:creationId xmlns:p14="http://schemas.microsoft.com/office/powerpoint/2010/main" val="3097747324"/>
       </p:ext>
     </p:extLst>
   </p:cSld>
@@ -6931,23 +6957,25 @@
                 <a:ea typeface="+mn-ea"/>
                 <a:cs typeface="+mn-cs"/>
               </a:rPr>
-              <a:t>This open discussion time often proved to be the most interesting. Someone would bring up a topic that applied to the Guild, and there would be lively discussion and debate, often ending with action items delegated to an existing SIG, or the formation of a new, short-term SIG.</a:t>
-            </a:r>
+              <a:t>As noted above, one of the jobs of the SIGs is to "create reference implementations". What does this mean?</a:t>
+            </a:r>
+            <a:endParaRPr lang="en-US" b="0" dirty="0">
+              <a:effectLst/>
+            </a:endParaRPr>
           </a:p>
           <a:p>
             <a:pPr rtl="0"/>
-            <a:endParaRPr lang="en-US" sz="1200" b="0" i="0" u="none" strike="noStrike" kern="1200" dirty="0">
-              <a:solidFill>
-                <a:schemeClr val="tx1"/>
-              </a:solidFill>
-              <a:effectLst/>
-              <a:latin typeface="+mn-lt"/>
-              <a:ea typeface="+mn-ea"/>
-              <a:cs typeface="+mn-cs"/>
-            </a:endParaRPr>
-          </a:p>
-          <a:p>
-            <a:pPr rtl="0"/>
+            <a:r>
+              <a:rPr lang="en-US" b="0" dirty="0">
+                <a:effectLst/>
+              </a:rPr>
+              <a:t/>
+            </a:r>
+            <a:br>
+              <a:rPr lang="en-US" b="0" dirty="0">
+                <a:effectLst/>
+              </a:rPr>
+            </a:br>
             <a:r>
               <a:rPr lang="en-US" sz="1200" b="0" i="0" u="none" strike="noStrike" kern="1200" dirty="0">
                 <a:solidFill>
@@ -6958,7 +6986,7 @@
                 <a:ea typeface="+mn-ea"/>
                 <a:cs typeface="+mn-cs"/>
               </a:rPr>
-              <a:t>All in all, the Enterprise Architecture guild proved to be a powerful tool to help bring some order to a potentially chaotic world.</a:t>
+              <a:t>Here's an example, based on my experience.</a:t>
             </a:r>
             <a:endParaRPr lang="en-US" b="0" dirty="0">
               <a:effectLst/>
@@ -6992,7 +7020,7 @@
     </p:spTree>
     <p:extLst>
       <p:ext uri="{BB962C8B-B14F-4D97-AF65-F5344CB8AC3E}">
-        <p14:creationId xmlns:p14="http://schemas.microsoft.com/office/powerpoint/2010/main" val="3097747324"/>
+        <p14:creationId xmlns:p14="http://schemas.microsoft.com/office/powerpoint/2010/main" val="2031319328"/>
       </p:ext>
     </p:extLst>
   </p:cSld>
@@ -7062,40 +7090,8 @@
                 <a:ea typeface="+mn-ea"/>
                 <a:cs typeface="+mn-cs"/>
               </a:rPr>
-              <a:t>As noted above, one of the jobs of the SIGs is to "create reference implementations". What does this mean?</a:t>
-            </a:r>
-            <a:endParaRPr lang="en-US" b="0" dirty="0">
-              <a:effectLst/>
-            </a:endParaRPr>
-          </a:p>
-          <a:p>
-            <a:pPr rtl="0"/>
-            <a:r>
-              <a:rPr lang="en-US" b="0" dirty="0">
-                <a:effectLst/>
-              </a:rPr>
-              <a:t/>
-            </a:r>
-            <a:br>
-              <a:rPr lang="en-US" b="0" dirty="0">
-                <a:effectLst/>
-              </a:rPr>
-            </a:br>
-            <a:r>
-              <a:rPr lang="en-US" sz="1200" b="0" i="0" u="none" strike="noStrike" kern="1200" dirty="0">
-                <a:solidFill>
-                  <a:schemeClr val="tx1"/>
-                </a:solidFill>
-                <a:effectLst/>
-                <a:latin typeface="+mn-lt"/>
-                <a:ea typeface="+mn-ea"/>
-                <a:cs typeface="+mn-cs"/>
-              </a:rPr>
-              <a:t>Here's an example, based on my experience.</a:t>
-            </a:r>
-            <a:endParaRPr lang="en-US" b="0" dirty="0">
-              <a:effectLst/>
-            </a:endParaRPr>
+              <a:t>A company I worked for had established Docker as our deployment platform (everything deployed is a container) with Vault for secret management, and Consul for service discovery and key/value store. There were a large number of Java developers, and their SIG had settled on Spring Boot as their preferred microservice platform. </a:t>
+            </a:r>
           </a:p>
         </p:txBody>
       </p:sp>
@@ -7125,7 +7121,7 @@
     </p:spTree>
     <p:extLst>
       <p:ext uri="{BB962C8B-B14F-4D97-AF65-F5344CB8AC3E}">
-        <p14:creationId xmlns:p14="http://schemas.microsoft.com/office/powerpoint/2010/main" val="2031319328"/>
+        <p14:creationId xmlns:p14="http://schemas.microsoft.com/office/powerpoint/2010/main" val="129386358"/>
       </p:ext>
     </p:extLst>
   </p:cSld>
@@ -7195,8 +7191,20 @@
                 <a:ea typeface="+mn-ea"/>
                 <a:cs typeface="+mn-cs"/>
               </a:rPr>
-              <a:t>A company I worked for had established Docker as our deployment platform (everything deployed is a container) with Vault for secret management, and Consul for service discovery and key/value store. There were a large number of Java developers, and their SIG had settled on Spring Boot as their preferred microservice platform. </a:t>
-            </a:r>
+              <a:t>This is a complex environment, with many moving pieces, so that SIG worked together to create a "base" reference implementation that took care of wiring all of the proper pieces together. A greenfield project could "copy" the reference implementation, and get a bunch of stuff for "free", </a:t>
+            </a:r>
+          </a:p>
+          <a:p>
+            <a:pPr rtl="0"/>
+            <a:endParaRPr lang="en-US" sz="1200" b="0" i="0" u="none" strike="noStrike" kern="1200" dirty="0">
+              <a:solidFill>
+                <a:schemeClr val="tx1"/>
+              </a:solidFill>
+              <a:effectLst/>
+              <a:latin typeface="+mn-lt"/>
+              <a:ea typeface="+mn-ea"/>
+              <a:cs typeface="+mn-cs"/>
+            </a:endParaRPr>
           </a:p>
         </p:txBody>
       </p:sp>
@@ -7226,7 +7234,7 @@
     </p:spTree>
     <p:extLst>
       <p:ext uri="{BB962C8B-B14F-4D97-AF65-F5344CB8AC3E}">
-        <p14:creationId xmlns:p14="http://schemas.microsoft.com/office/powerpoint/2010/main" val="129386358"/>
+        <p14:creationId xmlns:p14="http://schemas.microsoft.com/office/powerpoint/2010/main" val="1048343580"/>
       </p:ext>
     </p:extLst>
   </p:cSld>
@@ -7296,19 +7304,34 @@
                 <a:ea typeface="+mn-ea"/>
                 <a:cs typeface="+mn-cs"/>
               </a:rPr>
-              <a:t>This is a complex environment, with many moving pieces, so that SIG worked together to create a "base" reference implementation that took care of wiring all of the proper pieces together. A greenfield project could "copy" the reference implementation, and get a bunch of stuff for "free", </a:t>
-            </a:r>
-          </a:p>
-          <a:p>
-            <a:pPr rtl="0"/>
-            <a:endParaRPr lang="en-US" sz="1200" b="0" i="0" u="none" strike="noStrike" kern="1200" dirty="0">
-              <a:solidFill>
-                <a:schemeClr val="tx1"/>
-              </a:solidFill>
+              <a:t>with all of the right things set up to take advantage of Vault &amp; Consul, as well as anything else defined as part of our approach to application development (linting rules, static code analysis, security, </a:t>
+            </a:r>
+            <a:r>
+              <a:rPr lang="en-US" sz="1200" b="0" i="0" u="none" strike="noStrike" kern="1200" dirty="0" err="1">
+                <a:solidFill>
+                  <a:schemeClr val="tx1"/>
+                </a:solidFill>
+                <a:effectLst/>
+                <a:latin typeface="+mn-lt"/>
+                <a:ea typeface="+mn-ea"/>
+                <a:cs typeface="+mn-cs"/>
+              </a:rPr>
+              <a:t>etc</a:t>
+            </a:r>
+            <a:r>
+              <a:rPr lang="en-US" sz="1200" b="0" i="0" u="none" strike="noStrike" kern="1200" dirty="0">
+                <a:solidFill>
+                  <a:schemeClr val="tx1"/>
+                </a:solidFill>
+                <a:effectLst/>
+                <a:latin typeface="+mn-lt"/>
+                <a:ea typeface="+mn-ea"/>
+                <a:cs typeface="+mn-cs"/>
+              </a:rPr>
+              <a:t>).</a:t>
+            </a:r>
+            <a:endParaRPr lang="en-US" b="0" dirty="0">
               <a:effectLst/>
-              <a:latin typeface="+mn-lt"/>
-              <a:ea typeface="+mn-ea"/>
-              <a:cs typeface="+mn-cs"/>
             </a:endParaRPr>
           </a:p>
         </p:txBody>
@@ -7339,7 +7362,7 @@
     </p:spTree>
     <p:extLst>
       <p:ext uri="{BB962C8B-B14F-4D97-AF65-F5344CB8AC3E}">
-        <p14:creationId xmlns:p14="http://schemas.microsoft.com/office/powerpoint/2010/main" val="1048343580"/>
+        <p14:creationId xmlns:p14="http://schemas.microsoft.com/office/powerpoint/2010/main" val="2004091050"/>
       </p:ext>
     </p:extLst>
   </p:cSld>
@@ -7399,42 +7422,6 @@
           <a:lstStyle/>
           <a:p>
             <a:pPr rtl="0"/>
-            <a:r>
-              <a:rPr lang="en-US" sz="1200" b="0" i="0" u="none" strike="noStrike" kern="1200" dirty="0">
-                <a:solidFill>
-                  <a:schemeClr val="tx1"/>
-                </a:solidFill>
-                <a:effectLst/>
-                <a:latin typeface="+mn-lt"/>
-                <a:ea typeface="+mn-ea"/>
-                <a:cs typeface="+mn-cs"/>
-              </a:rPr>
-              <a:t>with all of the right things set up to take advantage of Vault &amp; Consul, as well as anything else defined as part of our approach to application development (linting rules, static code analysis, security, </a:t>
-            </a:r>
-            <a:r>
-              <a:rPr lang="en-US" sz="1200" b="0" i="0" u="none" strike="noStrike" kern="1200" dirty="0" err="1">
-                <a:solidFill>
-                  <a:schemeClr val="tx1"/>
-                </a:solidFill>
-                <a:effectLst/>
-                <a:latin typeface="+mn-lt"/>
-                <a:ea typeface="+mn-ea"/>
-                <a:cs typeface="+mn-cs"/>
-              </a:rPr>
-              <a:t>etc</a:t>
-            </a:r>
-            <a:r>
-              <a:rPr lang="en-US" sz="1200" b="0" i="0" u="none" strike="noStrike" kern="1200" dirty="0">
-                <a:solidFill>
-                  <a:schemeClr val="tx1"/>
-                </a:solidFill>
-                <a:effectLst/>
-                <a:latin typeface="+mn-lt"/>
-                <a:ea typeface="+mn-ea"/>
-                <a:cs typeface="+mn-cs"/>
-              </a:rPr>
-              <a:t>).</a:t>
-            </a:r>
             <a:endParaRPr lang="en-US" b="0" dirty="0">
               <a:effectLst/>
             </a:endParaRPr>
@@ -7467,7 +7454,7 @@
     </p:spTree>
     <p:extLst>
       <p:ext uri="{BB962C8B-B14F-4D97-AF65-F5344CB8AC3E}">
-        <p14:creationId xmlns:p14="http://schemas.microsoft.com/office/powerpoint/2010/main" val="2004091050"/>
+        <p14:creationId xmlns:p14="http://schemas.microsoft.com/office/powerpoint/2010/main" val="1902782798"/>
       </p:ext>
     </p:extLst>
   </p:cSld>
@@ -7559,7 +7546,7 @@
     </p:spTree>
     <p:extLst>
       <p:ext uri="{BB962C8B-B14F-4D97-AF65-F5344CB8AC3E}">
-        <p14:creationId xmlns:p14="http://schemas.microsoft.com/office/powerpoint/2010/main" val="1902782798"/>
+        <p14:creationId xmlns:p14="http://schemas.microsoft.com/office/powerpoint/2010/main" val="2503517"/>
       </p:ext>
     </p:extLst>
   </p:cSld>
@@ -7619,6 +7606,42 @@
           <a:lstStyle/>
           <a:p>
             <a:pPr rtl="0"/>
+            <a:r>
+              <a:rPr lang="en-US" sz="1200" b="0" i="0" u="none" strike="noStrike" kern="1200" dirty="0">
+                <a:solidFill>
+                  <a:schemeClr val="tx1"/>
+                </a:solidFill>
+                <a:effectLst/>
+                <a:latin typeface="+mn-lt"/>
+                <a:ea typeface="+mn-ea"/>
+                <a:cs typeface="+mn-cs"/>
+              </a:rPr>
+              <a:t>with all of the right things set up to take advantage of Vault &amp; Consul, as well as anything else defined as part of our approach to application development (linting rules, static code analysis, security, </a:t>
+            </a:r>
+            <a:r>
+              <a:rPr lang="en-US" sz="1200" b="0" i="0" u="none" strike="noStrike" kern="1200" dirty="0" err="1">
+                <a:solidFill>
+                  <a:schemeClr val="tx1"/>
+                </a:solidFill>
+                <a:effectLst/>
+                <a:latin typeface="+mn-lt"/>
+                <a:ea typeface="+mn-ea"/>
+                <a:cs typeface="+mn-cs"/>
+              </a:rPr>
+              <a:t>etc</a:t>
+            </a:r>
+            <a:r>
+              <a:rPr lang="en-US" sz="1200" b="0" i="0" u="none" strike="noStrike" kern="1200" dirty="0">
+                <a:solidFill>
+                  <a:schemeClr val="tx1"/>
+                </a:solidFill>
+                <a:effectLst/>
+                <a:latin typeface="+mn-lt"/>
+                <a:ea typeface="+mn-ea"/>
+                <a:cs typeface="+mn-cs"/>
+              </a:rPr>
+              <a:t>).</a:t>
+            </a:r>
             <a:endParaRPr lang="en-US" b="0" dirty="0">
               <a:effectLst/>
             </a:endParaRPr>
@@ -7651,7 +7674,7 @@
     </p:spTree>
     <p:extLst>
       <p:ext uri="{BB962C8B-B14F-4D97-AF65-F5344CB8AC3E}">
-        <p14:creationId xmlns:p14="http://schemas.microsoft.com/office/powerpoint/2010/main" val="2503517"/>
+        <p14:creationId xmlns:p14="http://schemas.microsoft.com/office/powerpoint/2010/main" val="3403602255"/>
       </p:ext>
     </p:extLst>
   </p:cSld>
@@ -7732,29 +7755,8 @@
                 <a:ea typeface="+mn-ea"/>
                 <a:cs typeface="+mn-cs"/>
               </a:rPr>
-              <a:t> to help make, document, and socialize our architectural decisions, and today, I’m going to talk about 3 </a:t>
-            </a:r>
-            <a:r>
-              <a:rPr lang="en-US" sz="1200" b="0" i="0" u="none" strike="noStrike" kern="1200" baseline="0" smtClean="0">
-                <a:solidFill>
-                  <a:schemeClr val="tx1"/>
-                </a:solidFill>
-                <a:effectLst/>
-                <a:latin typeface="+mn-lt"/>
-                <a:ea typeface="+mn-ea"/>
-                <a:cs typeface="+mn-cs"/>
-              </a:rPr>
-              <a:t>of them</a:t>
-            </a:r>
-            <a:endParaRPr lang="en-US" sz="1200" b="0" i="0" u="none" strike="noStrike" kern="1200" baseline="0" dirty="0" smtClean="0">
-              <a:solidFill>
-                <a:schemeClr val="tx1"/>
-              </a:solidFill>
-              <a:effectLst/>
-              <a:latin typeface="+mn-lt"/>
-              <a:ea typeface="+mn-ea"/>
-              <a:cs typeface="+mn-cs"/>
-            </a:endParaRPr>
+              <a:t> to help make, document, and socialize our architectural decisions, and today, I’m going to talk about 3 of them</a:t>
+            </a:r>
           </a:p>
         </p:txBody>
       </p:sp>
@@ -7844,42 +7846,6 @@
           <a:lstStyle/>
           <a:p>
             <a:pPr rtl="0"/>
-            <a:r>
-              <a:rPr lang="en-US" sz="1200" b="0" i="0" u="none" strike="noStrike" kern="1200" dirty="0">
-                <a:solidFill>
-                  <a:schemeClr val="tx1"/>
-                </a:solidFill>
-                <a:effectLst/>
-                <a:latin typeface="+mn-lt"/>
-                <a:ea typeface="+mn-ea"/>
-                <a:cs typeface="+mn-cs"/>
-              </a:rPr>
-              <a:t>with all of the right things set up to take advantage of Vault &amp; Consul, as well as anything else defined as part of our approach to application development (linting rules, static code analysis, security, </a:t>
-            </a:r>
-            <a:r>
-              <a:rPr lang="en-US" sz="1200" b="0" i="0" u="none" strike="noStrike" kern="1200" dirty="0" err="1">
-                <a:solidFill>
-                  <a:schemeClr val="tx1"/>
-                </a:solidFill>
-                <a:effectLst/>
-                <a:latin typeface="+mn-lt"/>
-                <a:ea typeface="+mn-ea"/>
-                <a:cs typeface="+mn-cs"/>
-              </a:rPr>
-              <a:t>etc</a:t>
-            </a:r>
-            <a:r>
-              <a:rPr lang="en-US" sz="1200" b="0" i="0" u="none" strike="noStrike" kern="1200" dirty="0">
-                <a:solidFill>
-                  <a:schemeClr val="tx1"/>
-                </a:solidFill>
-                <a:effectLst/>
-                <a:latin typeface="+mn-lt"/>
-                <a:ea typeface="+mn-ea"/>
-                <a:cs typeface="+mn-cs"/>
-              </a:rPr>
-              <a:t>).</a:t>
-            </a:r>
             <a:endParaRPr lang="en-US" b="0" dirty="0">
               <a:effectLst/>
             </a:endParaRPr>
@@ -7912,7 +7878,7 @@
     </p:spTree>
     <p:extLst>
       <p:ext uri="{BB962C8B-B14F-4D97-AF65-F5344CB8AC3E}">
-        <p14:creationId xmlns:p14="http://schemas.microsoft.com/office/powerpoint/2010/main" val="3403602255"/>
+        <p14:creationId xmlns:p14="http://schemas.microsoft.com/office/powerpoint/2010/main" val="2186857975"/>
       </p:ext>
     </p:extLst>
   </p:cSld>
@@ -7972,6 +7938,18 @@
           <a:lstStyle/>
           <a:p>
             <a:pPr rtl="0"/>
+            <a:r>
+              <a:rPr lang="en-US" sz="1200" b="0" i="0" u="none" strike="noStrike" kern="1200" dirty="0">
+                <a:solidFill>
+                  <a:schemeClr val="tx1"/>
+                </a:solidFill>
+                <a:effectLst/>
+                <a:latin typeface="+mn-lt"/>
+                <a:ea typeface="+mn-ea"/>
+                <a:cs typeface="+mn-cs"/>
+              </a:rPr>
+              <a:t>In the real world, this reference implementation really did help accelerate our progress. Just like the best frameworks are opinionated, our reference implementation was opinionated -- it baked in the best opinions of the Enterprise Architecture Guild &amp; the Java SIG into a consumable unit, rather than those opinions only being expressed in ADRs or other documentation. Seeing the opinions expressed as a reference implementation is very powerful, and helps show how abstract ideas are made into concrete implementations.</a:t>
+            </a:r>
             <a:endParaRPr lang="en-US" b="0" dirty="0">
               <a:effectLst/>
             </a:endParaRPr>
@@ -8004,7 +7982,7 @@
     </p:spTree>
     <p:extLst>
       <p:ext uri="{BB962C8B-B14F-4D97-AF65-F5344CB8AC3E}">
-        <p14:creationId xmlns:p14="http://schemas.microsoft.com/office/powerpoint/2010/main" val="2186857975"/>
+        <p14:creationId xmlns:p14="http://schemas.microsoft.com/office/powerpoint/2010/main" val="3471781983"/>
       </p:ext>
     </p:extLst>
   </p:cSld>
@@ -8074,7 +8052,7 @@
                 <a:ea typeface="+mn-ea"/>
                 <a:cs typeface="+mn-cs"/>
               </a:rPr>
-              <a:t>In the real world, this reference implementation really did help accelerate our progress. Just like the best frameworks are opinionated, our reference implementation was opinionated -- it baked in the best opinions of the Enterprise Architecture Guild &amp; the Java SIG into a consumable unit, rather than those opinions only being expressed in ADRs or other documentation. Seeing the opinions expressed as a reference implementation is very powerful, and helps show how abstract ideas are made into concrete implementations.</a:t>
+              <a:t>At that company, we were also developing Node.js applications and Ruby/Rails applications, and reference implementations were created for those as well that expressed the same Docker-based concepts, but specific to those other languages.</a:t>
             </a:r>
             <a:endParaRPr lang="en-US" b="0" dirty="0">
               <a:effectLst/>
@@ -8108,7 +8086,7 @@
     </p:spTree>
     <p:extLst>
       <p:ext uri="{BB962C8B-B14F-4D97-AF65-F5344CB8AC3E}">
-        <p14:creationId xmlns:p14="http://schemas.microsoft.com/office/powerpoint/2010/main" val="3471781983"/>
+        <p14:creationId xmlns:p14="http://schemas.microsoft.com/office/powerpoint/2010/main" val="1328256726"/>
       </p:ext>
     </p:extLst>
   </p:cSld>
@@ -8178,7 +8156,7 @@
                 <a:ea typeface="+mn-ea"/>
                 <a:cs typeface="+mn-cs"/>
               </a:rPr>
-              <a:t>At that company, we were also developing Node.js applications and Ruby/Rails applications, and reference implementations were created for those as well that expressed the same Docker-based concepts, but specific to those other languages.</a:t>
+              <a:t>If you begin building reference applications, there is an implicit commitment to maintaining them. As new standards emerge -- and they will -- these reference implementations need to be kept up to date so the opinions they express stay in line with the standards that evolving for the Enterprise.</a:t>
             </a:r>
             <a:endParaRPr lang="en-US" b="0" dirty="0">
               <a:effectLst/>
@@ -8212,7 +8190,7 @@
     </p:spTree>
     <p:extLst>
       <p:ext uri="{BB962C8B-B14F-4D97-AF65-F5344CB8AC3E}">
-        <p14:creationId xmlns:p14="http://schemas.microsoft.com/office/powerpoint/2010/main" val="1328256726"/>
+        <p14:creationId xmlns:p14="http://schemas.microsoft.com/office/powerpoint/2010/main" val="103137459"/>
       </p:ext>
     </p:extLst>
   </p:cSld>
@@ -8282,7 +8260,7 @@
                 <a:ea typeface="+mn-ea"/>
                 <a:cs typeface="+mn-cs"/>
               </a:rPr>
-              <a:t>If you begin building reference applications, there is an implicit commitment to maintaining them. As new standards emerge -- and they will -- these reference implementations need to be kept up to date so the opinions they express stay in line with the standards that evolving for the Enterprise.</a:t>
+              <a:t>But the benefits are well worth the cost of maintenance. Beyond serving as a kick start for new projects, and giving examples of standards in the form of actual code, these reference implementations serve as a way to guide people to follow the well-worn paths of those that have gone in front of them. In our environment, teams were allowed (pretty much) to choose to use the technology they wanted (with discussion &amp; agreement in the Guild first), but if someone wanted to build an application in Grails or Go, they would have to "invent" all of the solutions that were already baked into the reference applications to interact with the rest of the Enterprise. It wasn't an explicit deterrent, per-se, but it did tend to focus people's efforts in making the existing tech stacks more robust, rather than introducing new tech stacks. </a:t>
             </a:r>
             <a:endParaRPr lang="en-US" b="0" dirty="0">
               <a:effectLst/>
@@ -8316,7 +8294,7 @@
     </p:spTree>
     <p:extLst>
       <p:ext uri="{BB962C8B-B14F-4D97-AF65-F5344CB8AC3E}">
-        <p14:creationId xmlns:p14="http://schemas.microsoft.com/office/powerpoint/2010/main" val="103137459"/>
+        <p14:creationId xmlns:p14="http://schemas.microsoft.com/office/powerpoint/2010/main" val="731949884"/>
       </p:ext>
     </p:extLst>
   </p:cSld>
@@ -8386,7 +8364,7 @@
                 <a:ea typeface="+mn-ea"/>
                 <a:cs typeface="+mn-cs"/>
               </a:rPr>
-              <a:t>But the benefits are well worth the cost of maintenance. Beyond serving as a kick start for new projects, and giving examples of standards in the form of actual code, these reference implementations serve as a way to guide people to follow the well-worn paths of those that have gone in front of them. In our environment, teams were allowed (pretty much) to choose to use the technology they wanted (with discussion &amp; agreement in the Guild first), but if someone wanted to build an application in Grails or Go, they would have to "invent" all of the solutions that were already baked into the reference applications to interact with the rest of the Enterprise. It wasn't an explicit deterrent, per-se, but it did tend to focus people's efforts in making the existing tech stacks more robust, rather than introducing new tech stacks. </a:t>
+              <a:t>A great technique for this is a "tracer bullet"; minimal functionality that exercises all of the seams between teams in a project. It doesn't have to be fully functional, but it does actually have to interact with each system that will be present in the final solution. Doing this early, as part of the project inception, gives the team a strong foundation to build on for the rest of the project, and it usually exposes things that weren't properly thought out (that can lead to ADRs for the project!).</a:t>
             </a:r>
             <a:endParaRPr lang="en-US" b="0" dirty="0">
               <a:effectLst/>
@@ -8420,7 +8398,7 @@
     </p:spTree>
     <p:extLst>
       <p:ext uri="{BB962C8B-B14F-4D97-AF65-F5344CB8AC3E}">
-        <p14:creationId xmlns:p14="http://schemas.microsoft.com/office/powerpoint/2010/main" val="731949884"/>
+        <p14:creationId xmlns:p14="http://schemas.microsoft.com/office/powerpoint/2010/main" val="4254838272"/>
       </p:ext>
     </p:extLst>
   </p:cSld>
@@ -8490,7 +8468,65 @@
                 <a:ea typeface="+mn-ea"/>
                 <a:cs typeface="+mn-cs"/>
               </a:rPr>
-              <a:t>A great technique for this is a "tracer bullet"; minimal functionality that exercises all of the seams between teams in a project. It doesn't have to be fully functional, but it does actually have to interact with each system that will be present in the final solution. Doing this early, as part of the project inception, gives the team a strong foundation to build on for the rest of the project, and it usually exposes things that weren't properly thought out (that can lead to ADRs for the project!).</a:t>
+              <a:t>As I said at the beginning, Enterprise Architecture is at a crossroads, especially in organizations which do a lot of custom software development. This may sounds like hyperbole, but I think the tensions between these new ways of doing things and the "traditional" approach to Enterprise Architecture are very real.</a:t>
+            </a:r>
+            <a:endParaRPr lang="en-US" b="0" dirty="0">
+              <a:effectLst/>
+            </a:endParaRPr>
+          </a:p>
+          <a:p>
+            <a:pPr rtl="0"/>
+            <a:r>
+              <a:rPr lang="en-US" b="0" dirty="0">
+                <a:effectLst/>
+              </a:rPr>
+              <a:t/>
+            </a:r>
+            <a:br>
+              <a:rPr lang="en-US" b="0" dirty="0">
+                <a:effectLst/>
+              </a:rPr>
+            </a:br>
+            <a:r>
+              <a:rPr lang="en-US" sz="1200" b="0" i="0" u="none" strike="noStrike" kern="1200" dirty="0">
+                <a:solidFill>
+                  <a:schemeClr val="tx1"/>
+                </a:solidFill>
+                <a:effectLst/>
+                <a:latin typeface="+mn-lt"/>
+                <a:ea typeface="+mn-ea"/>
+                <a:cs typeface="+mn-cs"/>
+              </a:rPr>
+              <a:t>I think that Enterprise Architecture professionals need to look at techniques like the ones I have presented here, and look to add them to their professional "toolbox". This doesn't mean abandoning "traditional" approaches. I'm suggesting an evolution, not a revolution. But change is going to be necessary, because the rest of technology is changing, whether we like it or not.</a:t>
+            </a:r>
+            <a:endParaRPr lang="en-US" b="0" dirty="0">
+              <a:effectLst/>
+            </a:endParaRPr>
+          </a:p>
+          <a:p>
+            <a:pPr rtl="0"/>
+            <a:r>
+              <a:rPr lang="en-US" b="0" dirty="0">
+                <a:effectLst/>
+              </a:rPr>
+              <a:t/>
+            </a:r>
+            <a:br>
+              <a:rPr lang="en-US" b="0" dirty="0">
+                <a:effectLst/>
+              </a:rPr>
+            </a:br>
+            <a:r>
+              <a:rPr lang="en-US" sz="1200" b="0" i="0" u="none" strike="noStrike" kern="1200" dirty="0">
+                <a:solidFill>
+                  <a:schemeClr val="tx1"/>
+                </a:solidFill>
+                <a:effectLst/>
+                <a:latin typeface="+mn-lt"/>
+                <a:ea typeface="+mn-ea"/>
+                <a:cs typeface="+mn-cs"/>
+              </a:rPr>
+              <a:t>Hopefully I've given you some idea to think about and maybe adopt. Thank you for your time!</a:t>
             </a:r>
             <a:endParaRPr lang="en-US" b="0" dirty="0">
               <a:effectLst/>
@@ -8524,7 +8560,7 @@
     </p:spTree>
     <p:extLst>
       <p:ext uri="{BB962C8B-B14F-4D97-AF65-F5344CB8AC3E}">
-        <p14:creationId xmlns:p14="http://schemas.microsoft.com/office/powerpoint/2010/main" val="4254838272"/>
+        <p14:creationId xmlns:p14="http://schemas.microsoft.com/office/powerpoint/2010/main" val="2456180645"/>
       </p:ext>
     </p:extLst>
   </p:cSld>
@@ -8561,12 +8597,7 @@
             <p:ph type="sldImg"/>
           </p:nvPr>
         </p:nvSpPr>
-        <p:spPr>
-          <a:xfrm>
-            <a:off x="685800" y="1143000"/>
-            <a:ext cx="5486400" cy="3086100"/>
-          </a:xfrm>
-        </p:spPr>
+        <p:spPr/>
       </p:sp>
       <p:sp>
         <p:nvSpPr>
@@ -8583,80 +8614,7 @@
           <a:bodyPr/>
           <a:lstStyle/>
           <a:p>
-            <a:pPr rtl="0"/>
-            <a:r>
-              <a:rPr lang="en-US" sz="1200" b="0" i="0" u="none" strike="noStrike" kern="1200" dirty="0">
-                <a:solidFill>
-                  <a:schemeClr val="tx1"/>
-                </a:solidFill>
-                <a:effectLst/>
-                <a:latin typeface="+mn-lt"/>
-                <a:ea typeface="+mn-ea"/>
-                <a:cs typeface="+mn-cs"/>
-              </a:rPr>
-              <a:t>As I said at the beginning, Enterprise Architecture is at a crossroads, especially in organizations which do a lot of custom software development. This may sounds like hyperbole, but I think the tensions between these new ways of doing things and the "traditional" approach to Enterprise Architecture are very real.</a:t>
-            </a:r>
-            <a:endParaRPr lang="en-US" b="0" dirty="0">
-              <a:effectLst/>
-            </a:endParaRPr>
-          </a:p>
-          <a:p>
-            <a:pPr rtl="0"/>
-            <a:r>
-              <a:rPr lang="en-US" b="0" dirty="0">
-                <a:effectLst/>
-              </a:rPr>
-              <a:t/>
-            </a:r>
-            <a:br>
-              <a:rPr lang="en-US" b="0" dirty="0">
-                <a:effectLst/>
-              </a:rPr>
-            </a:br>
-            <a:r>
-              <a:rPr lang="en-US" sz="1200" b="0" i="0" u="none" strike="noStrike" kern="1200" dirty="0">
-                <a:solidFill>
-                  <a:schemeClr val="tx1"/>
-                </a:solidFill>
-                <a:effectLst/>
-                <a:latin typeface="+mn-lt"/>
-                <a:ea typeface="+mn-ea"/>
-                <a:cs typeface="+mn-cs"/>
-              </a:rPr>
-              <a:t>I think that Enterprise Architecture professionals need to look at techniques like the ones I have presented here, and look to add them to their professional "toolbox". This doesn't mean abandoning "traditional" approaches. I'm suggesting an evolution, not a revolution. But change is going to be necessary, because the rest of technology is changing, whether we like it or not.</a:t>
-            </a:r>
-            <a:endParaRPr lang="en-US" b="0" dirty="0">
-              <a:effectLst/>
-            </a:endParaRPr>
-          </a:p>
-          <a:p>
-            <a:pPr rtl="0"/>
-            <a:r>
-              <a:rPr lang="en-US" b="0" dirty="0">
-                <a:effectLst/>
-              </a:rPr>
-              <a:t/>
-            </a:r>
-            <a:br>
-              <a:rPr lang="en-US" b="0" dirty="0">
-                <a:effectLst/>
-              </a:rPr>
-            </a:br>
-            <a:r>
-              <a:rPr lang="en-US" sz="1200" b="0" i="0" u="none" strike="noStrike" kern="1200" dirty="0">
-                <a:solidFill>
-                  <a:schemeClr val="tx1"/>
-                </a:solidFill>
-                <a:effectLst/>
-                <a:latin typeface="+mn-lt"/>
-                <a:ea typeface="+mn-ea"/>
-                <a:cs typeface="+mn-cs"/>
-              </a:rPr>
-              <a:t>Hopefully I've given you some idea to think about and maybe adopt. Thank you for your time!</a:t>
-            </a:r>
-            <a:endParaRPr lang="en-US" b="0" dirty="0">
-              <a:effectLst/>
-            </a:endParaRPr>
+            <a:endParaRPr lang="en-US" dirty="0"/>
           </a:p>
         </p:txBody>
       </p:sp>
@@ -8678,90 +8636,6 @@
             <a:fld id="{096F4AFB-61BD-1340-90B6-0FECED04B0A2}" type="slidenum">
               <a:rPr lang="en-US" smtClean="0"/>
               <a:t>67</a:t>
-            </a:fld>
-            <a:endParaRPr lang="en-US"/>
-          </a:p>
-        </p:txBody>
-      </p:sp>
-    </p:spTree>
-    <p:extLst>
-      <p:ext uri="{BB962C8B-B14F-4D97-AF65-F5344CB8AC3E}">
-        <p14:creationId xmlns:p14="http://schemas.microsoft.com/office/powerpoint/2010/main" val="2456180645"/>
-      </p:ext>
-    </p:extLst>
-  </p:cSld>
-  <p:clrMapOvr>
-    <a:masterClrMapping/>
-  </p:clrMapOvr>
-</p:notes>
-</file>
-
-<file path=ppt/notesSlides/notesSlide68.xml><?xml version="1.0" encoding="utf-8"?>
-<p:notes xmlns:a="http://schemas.openxmlformats.org/drawingml/2006/main" xmlns:r="http://schemas.openxmlformats.org/officeDocument/2006/relationships" xmlns:p="http://schemas.openxmlformats.org/presentationml/2006/main">
-  <p:cSld>
-    <p:spTree>
-      <p:nvGrpSpPr>
-        <p:cNvPr id="1" name=""/>
-        <p:cNvGrpSpPr/>
-        <p:nvPr/>
-      </p:nvGrpSpPr>
-      <p:grpSpPr>
-        <a:xfrm>
-          <a:off x="0" y="0"/>
-          <a:ext cx="0" cy="0"/>
-          <a:chOff x="0" y="0"/>
-          <a:chExt cx="0" cy="0"/>
-        </a:xfrm>
-      </p:grpSpPr>
-      <p:sp>
-        <p:nvSpPr>
-          <p:cNvPr id="2" name="Slide Image Placeholder 1"/>
-          <p:cNvSpPr>
-            <a:spLocks noGrp="1" noRot="1" noChangeAspect="1"/>
-          </p:cNvSpPr>
-          <p:nvPr>
-            <p:ph type="sldImg"/>
-          </p:nvPr>
-        </p:nvSpPr>
-        <p:spPr/>
-      </p:sp>
-      <p:sp>
-        <p:nvSpPr>
-          <p:cNvPr id="3" name="Notes Placeholder 2"/>
-          <p:cNvSpPr>
-            <a:spLocks noGrp="1"/>
-          </p:cNvSpPr>
-          <p:nvPr>
-            <p:ph type="body" idx="1"/>
-          </p:nvPr>
-        </p:nvSpPr>
-        <p:spPr/>
-        <p:txBody>
-          <a:bodyPr/>
-          <a:lstStyle/>
-          <a:p>
-            <a:endParaRPr lang="en-US" dirty="0"/>
-          </a:p>
-        </p:txBody>
-      </p:sp>
-      <p:sp>
-        <p:nvSpPr>
-          <p:cNvPr id="4" name="Slide Number Placeholder 3"/>
-          <p:cNvSpPr>
-            <a:spLocks noGrp="1"/>
-          </p:cNvSpPr>
-          <p:nvPr>
-            <p:ph type="sldNum" sz="quarter" idx="10"/>
-          </p:nvPr>
-        </p:nvSpPr>
-        <p:spPr/>
-        <p:txBody>
-          <a:bodyPr/>
-          <a:lstStyle/>
-          <a:p>
-            <a:fld id="{096F4AFB-61BD-1340-90B6-0FECED04B0A2}" type="slidenum">
-              <a:rPr lang="en-US" smtClean="0"/>
-              <a:t>68</a:t>
             </a:fld>
             <a:endParaRPr lang="en-US"/>
           </a:p>
@@ -9224,7 +9098,7 @@
           <a:p>
             <a:fld id="{F35D5A91-02EC-B04A-8A79-709009E61D04}" type="datetimeFigureOut">
               <a:rPr lang="en-US" smtClean="0"/>
-              <a:t>4/4/2019</a:t>
+              <a:t>4/9/2019</a:t>
             </a:fld>
             <a:endParaRPr lang="en-US"/>
           </a:p>
@@ -9422,7 +9296,7 @@
           <a:p>
             <a:fld id="{F35D5A91-02EC-B04A-8A79-709009E61D04}" type="datetimeFigureOut">
               <a:rPr lang="en-US" smtClean="0"/>
-              <a:t>4/4/2019</a:t>
+              <a:t>4/9/2019</a:t>
             </a:fld>
             <a:endParaRPr lang="en-US"/>
           </a:p>
@@ -9630,7 +9504,7 @@
           <a:p>
             <a:fld id="{F35D5A91-02EC-B04A-8A79-709009E61D04}" type="datetimeFigureOut">
               <a:rPr lang="en-US" smtClean="0"/>
-              <a:t>4/4/2019</a:t>
+              <a:t>4/9/2019</a:t>
             </a:fld>
             <a:endParaRPr lang="en-US"/>
           </a:p>
@@ -9828,7 +9702,7 @@
           <a:p>
             <a:fld id="{F35D5A91-02EC-B04A-8A79-709009E61D04}" type="datetimeFigureOut">
               <a:rPr lang="en-US" smtClean="0"/>
-              <a:t>4/4/2019</a:t>
+              <a:t>4/9/2019</a:t>
             </a:fld>
             <a:endParaRPr lang="en-US"/>
           </a:p>
@@ -10103,7 +9977,7 @@
           <a:p>
             <a:fld id="{F35D5A91-02EC-B04A-8A79-709009E61D04}" type="datetimeFigureOut">
               <a:rPr lang="en-US" smtClean="0"/>
-              <a:t>4/4/2019</a:t>
+              <a:t>4/9/2019</a:t>
             </a:fld>
             <a:endParaRPr lang="en-US"/>
           </a:p>
@@ -10368,7 +10242,7 @@
           <a:p>
             <a:fld id="{F35D5A91-02EC-B04A-8A79-709009E61D04}" type="datetimeFigureOut">
               <a:rPr lang="en-US" smtClean="0"/>
-              <a:t>4/4/2019</a:t>
+              <a:t>4/9/2019</a:t>
             </a:fld>
             <a:endParaRPr lang="en-US"/>
           </a:p>
@@ -10780,7 +10654,7 @@
           <a:p>
             <a:fld id="{F35D5A91-02EC-B04A-8A79-709009E61D04}" type="datetimeFigureOut">
               <a:rPr lang="en-US" smtClean="0"/>
-              <a:t>4/4/2019</a:t>
+              <a:t>4/9/2019</a:t>
             </a:fld>
             <a:endParaRPr lang="en-US"/>
           </a:p>
@@ -10921,7 +10795,7 @@
           <a:p>
             <a:fld id="{F35D5A91-02EC-B04A-8A79-709009E61D04}" type="datetimeFigureOut">
               <a:rPr lang="en-US" smtClean="0"/>
-              <a:t>4/4/2019</a:t>
+              <a:t>4/9/2019</a:t>
             </a:fld>
             <a:endParaRPr lang="en-US"/>
           </a:p>
@@ -11034,7 +10908,7 @@
           <a:p>
             <a:fld id="{F35D5A91-02EC-B04A-8A79-709009E61D04}" type="datetimeFigureOut">
               <a:rPr lang="en-US" smtClean="0"/>
-              <a:t>4/4/2019</a:t>
+              <a:t>4/9/2019</a:t>
             </a:fld>
             <a:endParaRPr lang="en-US"/>
           </a:p>
@@ -11345,7 +11219,7 @@
           <a:p>
             <a:fld id="{F35D5A91-02EC-B04A-8A79-709009E61D04}" type="datetimeFigureOut">
               <a:rPr lang="en-US" smtClean="0"/>
-              <a:t>4/4/2019</a:t>
+              <a:t>4/9/2019</a:t>
             </a:fld>
             <a:endParaRPr lang="en-US"/>
           </a:p>
@@ -11633,7 +11507,7 @@
           <a:p>
             <a:fld id="{F35D5A91-02EC-B04A-8A79-709009E61D04}" type="datetimeFigureOut">
               <a:rPr lang="en-US" smtClean="0"/>
-              <a:t>4/4/2019</a:t>
+              <a:t>4/9/2019</a:t>
             </a:fld>
             <a:endParaRPr lang="en-US"/>
           </a:p>
@@ -11874,7 +11748,7 @@
           <a:p>
             <a:fld id="{F35D5A91-02EC-B04A-8A79-709009E61D04}" type="datetimeFigureOut">
               <a:rPr lang="en-US" smtClean="0"/>
-              <a:t>4/4/2019</a:t>
+              <a:t>4/9/2019</a:t>
             </a:fld>
             <a:endParaRPr lang="en-US"/>
           </a:p>
@@ -12403,7 +12277,7 @@
                   <a:schemeClr val="bg1"/>
                 </a:solidFill>
               </a:rPr>
-              <a:t>dayers@lesl.com</a:t>
+              <a:t>david.a.ayers@gmail.com</a:t>
             </a:r>
             <a:endParaRPr lang="en-US" sz="3200" dirty="0">
               <a:solidFill>
@@ -12566,7 +12440,7 @@
         </p:nvSpPr>
         <p:spPr>
           <a:xfrm>
-            <a:off x="838200" y="2365324"/>
+            <a:off x="739346" y="280226"/>
             <a:ext cx="10515600" cy="2127352"/>
           </a:xfrm>
         </p:spPr>
@@ -12584,6 +12458,36 @@
           </a:p>
         </p:txBody>
       </p:sp>
+      <p:pic>
+        <p:nvPicPr>
+          <p:cNvPr id="4" name="Picture 3"/>
+          <p:cNvPicPr>
+            <a:picLocks noChangeAspect="1"/>
+          </p:cNvPicPr>
+          <p:nvPr/>
+        </p:nvPicPr>
+        <p:blipFill>
+          <a:blip r:embed="rId3">
+            <a:extLst>
+              <a:ext uri="{28A0092B-C50C-407E-A947-70E740481C1C}">
+                <a14:useLocalDpi xmlns:a14="http://schemas.microsoft.com/office/drawing/2010/main" val="0"/>
+              </a:ext>
+            </a:extLst>
+          </a:blip>
+          <a:stretch>
+            <a:fillRect/>
+          </a:stretch>
+        </p:blipFill>
+        <p:spPr>
+          <a:xfrm>
+            <a:off x="4825386" y="2757908"/>
+            <a:ext cx="2343519" cy="2343519"/>
+          </a:xfrm>
+          <a:prstGeom prst="rect">
+            <a:avLst/>
+          </a:prstGeom>
+        </p:spPr>
+      </p:pic>
     </p:spTree>
     <p:extLst>
       <p:ext uri="{BB962C8B-B14F-4D97-AF65-F5344CB8AC3E}">
@@ -12795,7 +12699,7 @@
         </p:nvSpPr>
         <p:spPr>
           <a:xfrm>
-            <a:off x="838200" y="2365324"/>
+            <a:off x="838200" y="976545"/>
             <a:ext cx="10515600" cy="2127352"/>
           </a:xfrm>
         </p:spPr>
@@ -12820,6 +12724,36 @@
           </a:p>
         </p:txBody>
       </p:sp>
+      <p:pic>
+        <p:nvPicPr>
+          <p:cNvPr id="3" name="Picture 2"/>
+          <p:cNvPicPr>
+            <a:picLocks noChangeAspect="1"/>
+          </p:cNvPicPr>
+          <p:nvPr/>
+        </p:nvPicPr>
+        <p:blipFill>
+          <a:blip r:embed="rId3">
+            <a:extLst>
+              <a:ext uri="{28A0092B-C50C-407E-A947-70E740481C1C}">
+                <a14:useLocalDpi xmlns:a14="http://schemas.microsoft.com/office/drawing/2010/main" val="0"/>
+              </a:ext>
+            </a:extLst>
+          </a:blip>
+          <a:stretch>
+            <a:fillRect/>
+          </a:stretch>
+        </p:blipFill>
+        <p:spPr>
+          <a:xfrm>
+            <a:off x="5069213" y="3482253"/>
+            <a:ext cx="2053574" cy="2053574"/>
+          </a:xfrm>
+          <a:prstGeom prst="rect">
+            <a:avLst/>
+          </a:prstGeom>
+        </p:spPr>
+      </p:pic>
     </p:spTree>
     <p:extLst>
       <p:ext uri="{BB962C8B-B14F-4D97-AF65-F5344CB8AC3E}">
@@ -13070,41 +13004,36 @@
           </a:p>
         </p:txBody>
       </p:sp>
-      <p:sp>
-        <p:nvSpPr>
-          <p:cNvPr id="5" name="TextBox 4">
+      <p:pic>
+        <p:nvPicPr>
+          <p:cNvPr id="2" name="Picture 1"/>
+          <p:cNvPicPr>
+            <a:picLocks noChangeAspect="1"/>
+          </p:cNvPicPr>
+          <p:nvPr/>
+        </p:nvPicPr>
+        <p:blipFill>
+          <a:blip r:embed="rId3">
             <a:extLst>
-              <a:ext uri="{FF2B5EF4-FFF2-40B4-BE49-F238E27FC236}">
-                <a16:creationId xmlns:a16="http://schemas.microsoft.com/office/drawing/2014/main" id="{DDD7DCB0-0102-1E40-9255-78A3A79886C6}"/>
+              <a:ext uri="{28A0092B-C50C-407E-A947-70E740481C1C}">
+                <a14:useLocalDpi xmlns:a14="http://schemas.microsoft.com/office/drawing/2010/main" val="0"/>
               </a:ext>
             </a:extLst>
-          </p:cNvPr>
-          <p:cNvSpPr txBox="1"/>
-          <p:nvPr/>
-        </p:nvSpPr>
+          </a:blip>
+          <a:stretch>
+            <a:fillRect/>
+          </a:stretch>
+        </p:blipFill>
         <p:spPr>
           <a:xfrm>
-            <a:off x="7890388" y="5294672"/>
-            <a:ext cx="1338828" cy="1477328"/>
+            <a:off x="8266961" y="4599065"/>
+            <a:ext cx="2075644" cy="2075644"/>
           </a:xfrm>
           <a:prstGeom prst="rect">
             <a:avLst/>
           </a:prstGeom>
-          <a:noFill/>
-        </p:spPr>
-        <p:txBody>
-          <a:bodyPr wrap="none" rtlCol="0">
-            <a:spAutoFit/>
-          </a:bodyPr>
-          <a:lstStyle/>
-          <a:p>
-            <a:r>
-              <a:rPr lang="en-US" sz="9000" dirty="0"/>
-              <a:t>🙋‍♀️</a:t>
-            </a:r>
-          </a:p>
-        </p:txBody>
-      </p:sp>
+        </p:spPr>
+      </p:pic>
     </p:spTree>
     <p:extLst>
       <p:ext uri="{BB962C8B-B14F-4D97-AF65-F5344CB8AC3E}">
@@ -13200,41 +13129,36 @@
           </a:p>
         </p:txBody>
       </p:sp>
-      <p:sp>
-        <p:nvSpPr>
-          <p:cNvPr id="5" name="TextBox 4">
+      <p:pic>
+        <p:nvPicPr>
+          <p:cNvPr id="6" name="Picture 5"/>
+          <p:cNvPicPr>
+            <a:picLocks noChangeAspect="1"/>
+          </p:cNvPicPr>
+          <p:nvPr/>
+        </p:nvPicPr>
+        <p:blipFill>
+          <a:blip r:embed="rId3">
             <a:extLst>
-              <a:ext uri="{FF2B5EF4-FFF2-40B4-BE49-F238E27FC236}">
-                <a16:creationId xmlns:a16="http://schemas.microsoft.com/office/drawing/2014/main" id="{6B72547F-225F-4540-B09C-B5CB422CAEF2}"/>
+              <a:ext uri="{28A0092B-C50C-407E-A947-70E740481C1C}">
+                <a14:useLocalDpi xmlns:a14="http://schemas.microsoft.com/office/drawing/2010/main" val="0"/>
               </a:ext>
             </a:extLst>
-          </p:cNvPr>
-          <p:cNvSpPr txBox="1"/>
-          <p:nvPr/>
-        </p:nvSpPr>
+          </a:blip>
+          <a:stretch>
+            <a:fillRect/>
+          </a:stretch>
+        </p:blipFill>
         <p:spPr>
           <a:xfrm>
-            <a:off x="7890388" y="5294672"/>
-            <a:ext cx="1338828" cy="1477328"/>
+            <a:off x="8398771" y="4698948"/>
+            <a:ext cx="1978849" cy="1978849"/>
           </a:xfrm>
           <a:prstGeom prst="rect">
             <a:avLst/>
           </a:prstGeom>
-          <a:noFill/>
-        </p:spPr>
-        <p:txBody>
-          <a:bodyPr wrap="none" rtlCol="0">
-            <a:spAutoFit/>
-          </a:bodyPr>
-          <a:lstStyle/>
-          <a:p>
-            <a:r>
-              <a:rPr lang="en-US" sz="9000" dirty="0"/>
-              <a:t>🤷‍♀️</a:t>
-            </a:r>
-          </a:p>
-        </p:txBody>
-      </p:sp>
+        </p:spPr>
+      </p:pic>
     </p:spTree>
     <p:extLst>
       <p:ext uri="{BB962C8B-B14F-4D97-AF65-F5344CB8AC3E}">
@@ -13330,41 +13254,36 @@
           </a:p>
         </p:txBody>
       </p:sp>
-      <p:sp>
-        <p:nvSpPr>
-          <p:cNvPr id="4" name="TextBox 3">
+      <p:pic>
+        <p:nvPicPr>
+          <p:cNvPr id="5" name="Picture 4"/>
+          <p:cNvPicPr>
+            <a:picLocks noChangeAspect="1"/>
+          </p:cNvPicPr>
+          <p:nvPr/>
+        </p:nvPicPr>
+        <p:blipFill>
+          <a:blip r:embed="rId3">
             <a:extLst>
-              <a:ext uri="{FF2B5EF4-FFF2-40B4-BE49-F238E27FC236}">
-                <a16:creationId xmlns:a16="http://schemas.microsoft.com/office/drawing/2014/main" id="{F0764BCA-94A5-714F-887B-7AFD43E41D1C}"/>
+              <a:ext uri="{28A0092B-C50C-407E-A947-70E740481C1C}">
+                <a14:useLocalDpi xmlns:a14="http://schemas.microsoft.com/office/drawing/2010/main" val="0"/>
               </a:ext>
             </a:extLst>
-          </p:cNvPr>
-          <p:cNvSpPr txBox="1"/>
-          <p:nvPr/>
-        </p:nvSpPr>
+          </a:blip>
+          <a:stretch>
+            <a:fillRect/>
+          </a:stretch>
+        </p:blipFill>
         <p:spPr>
           <a:xfrm>
-            <a:off x="7890388" y="5294672"/>
-            <a:ext cx="1338828" cy="1477328"/>
+            <a:off x="8316097" y="4312800"/>
+            <a:ext cx="2545200" cy="2545200"/>
           </a:xfrm>
           <a:prstGeom prst="rect">
             <a:avLst/>
           </a:prstGeom>
-          <a:noFill/>
-        </p:spPr>
-        <p:txBody>
-          <a:bodyPr wrap="none" rtlCol="0">
-            <a:spAutoFit/>
-          </a:bodyPr>
-          <a:lstStyle/>
-          <a:p>
-            <a:r>
-              <a:rPr lang="en-US" sz="9000" dirty="0"/>
-              <a:t>💁‍♀️</a:t>
-            </a:r>
-          </a:p>
-        </p:txBody>
-      </p:sp>
+        </p:spPr>
+      </p:pic>
     </p:spTree>
     <p:extLst>
       <p:ext uri="{BB962C8B-B14F-4D97-AF65-F5344CB8AC3E}">
@@ -13458,7 +13377,7 @@
         </p:nvSpPr>
         <p:spPr>
           <a:xfrm>
-            <a:off x="627916" y="1659779"/>
+            <a:off x="751483" y="1523855"/>
             <a:ext cx="10527241" cy="461665"/>
           </a:xfrm>
           <a:prstGeom prst="rect">
@@ -13498,7 +13417,7 @@
         </p:nvSpPr>
         <p:spPr>
           <a:xfrm>
-            <a:off x="2660171" y="2762098"/>
+            <a:off x="2783738" y="3627497"/>
             <a:ext cx="6462731" cy="461665"/>
           </a:xfrm>
           <a:prstGeom prst="rect">
@@ -13554,7 +13473,7 @@
         </p:nvSpPr>
         <p:spPr>
           <a:xfrm>
-            <a:off x="2986542" y="3998529"/>
+            <a:off x="3110109" y="2575676"/>
             <a:ext cx="5809988" cy="461665"/>
           </a:xfrm>
           <a:prstGeom prst="rect">
@@ -13607,7 +13526,7 @@
         </p:nvSpPr>
         <p:spPr>
           <a:xfrm>
-            <a:off x="3085196" y="5336068"/>
+            <a:off x="3208758" y="4679318"/>
             <a:ext cx="5612690" cy="461665"/>
           </a:xfrm>
           <a:prstGeom prst="rect">
@@ -13630,6 +13549,51 @@
               </a:rPr>
               <a:t>Believer &amp; advocate for technology-as-craft</a:t>
             </a:r>
+          </a:p>
+        </p:txBody>
+      </p:sp>
+      <p:sp>
+        <p:nvSpPr>
+          <p:cNvPr id="10" name="TextBox 9">
+            <a:extLst>
+              <a:ext uri="{FF2B5EF4-FFF2-40B4-BE49-F238E27FC236}">
+                <a16:creationId xmlns:a16="http://schemas.microsoft.com/office/drawing/2014/main" id="{81638456-B195-2944-97EE-12EEFF77E544}"/>
+              </a:ext>
+            </a:extLst>
+          </p:cNvPr>
+          <p:cNvSpPr txBox="1"/>
+          <p:nvPr/>
+        </p:nvSpPr>
+        <p:spPr>
+          <a:xfrm>
+            <a:off x="5207768" y="5731139"/>
+            <a:ext cx="1614673" cy="461665"/>
+          </a:xfrm>
+          <a:prstGeom prst="rect">
+            <a:avLst/>
+          </a:prstGeom>
+          <a:noFill/>
+        </p:spPr>
+        <p:txBody>
+          <a:bodyPr wrap="none" rtlCol="0">
+            <a:spAutoFit/>
+          </a:bodyPr>
+          <a:lstStyle/>
+          <a:p>
+            <a:pPr algn="ctr"/>
+            <a:r>
+              <a:rPr lang="en-US" sz="2400" dirty="0" smtClean="0">
+                <a:solidFill>
+                  <a:schemeClr val="bg1"/>
+                </a:solidFill>
+              </a:rPr>
+              <a:t>Giant Nerd</a:t>
+            </a:r>
+            <a:endParaRPr lang="en-US" sz="2400" dirty="0">
+              <a:solidFill>
+                <a:schemeClr val="bg1"/>
+              </a:solidFill>
+            </a:endParaRPr>
           </a:p>
         </p:txBody>
       </p:sp>
@@ -15542,13 +15506,40 @@
             <a:br>
               <a:rPr lang="en-US" sz="6600" dirty="0"/>
             </a:br>
-            <a:r>
-              <a:rPr lang="en-US" sz="9600" dirty="0"/>
-              <a:t>👍🏽</a:t>
-            </a:r>
-          </a:p>
-        </p:txBody>
-      </p:sp>
+            <a:endParaRPr lang="en-US" sz="9600" dirty="0"/>
+          </a:p>
+        </p:txBody>
+      </p:sp>
+      <p:pic>
+        <p:nvPicPr>
+          <p:cNvPr id="3" name="Picture 2"/>
+          <p:cNvPicPr>
+            <a:picLocks noChangeAspect="1"/>
+          </p:cNvPicPr>
+          <p:nvPr/>
+        </p:nvPicPr>
+        <p:blipFill>
+          <a:blip r:embed="rId3">
+            <a:extLst>
+              <a:ext uri="{28A0092B-C50C-407E-A947-70E740481C1C}">
+                <a14:useLocalDpi xmlns:a14="http://schemas.microsoft.com/office/drawing/2010/main" val="0"/>
+              </a:ext>
+            </a:extLst>
+          </a:blip>
+          <a:stretch>
+            <a:fillRect/>
+          </a:stretch>
+        </p:blipFill>
+        <p:spPr>
+          <a:xfrm>
+            <a:off x="5126140" y="3172854"/>
+            <a:ext cx="1939719" cy="1939719"/>
+          </a:xfrm>
+          <a:prstGeom prst="rect">
+            <a:avLst/>
+          </a:prstGeom>
+        </p:spPr>
+      </p:pic>
     </p:spTree>
     <p:extLst>
       <p:ext uri="{BB962C8B-B14F-4D97-AF65-F5344CB8AC3E}">
@@ -16154,7 +16145,7 @@
         </p:nvSpPr>
         <p:spPr>
           <a:xfrm>
-            <a:off x="838200" y="2365324"/>
+            <a:off x="838200" y="462383"/>
             <a:ext cx="10515600" cy="2127352"/>
           </a:xfrm>
         </p:spPr>
@@ -16167,25 +16158,80 @@
             <a:pPr algn="ctr"/>
             <a:r>
               <a:rPr lang="en-US" sz="6600" dirty="0"/>
-              <a:t>Two Pizzas!</a:t>
-            </a:r>
-            <a:br>
+              <a:t>Two </a:t>
+            </a:r>
+            <a:r>
+              <a:rPr lang="en-US" sz="6600" dirty="0" smtClean="0"/>
+              <a:t>Pizzas</a:t>
+            </a:r>
+            <a:r>
               <a:rPr lang="en-US" sz="6600" dirty="0"/>
-            </a:br>
-            <a:r>
-              <a:rPr lang="en-US" sz="6600" dirty="0"/>
-              <a:t/>
-            </a:r>
-            <a:br>
-              <a:rPr lang="en-US" sz="6600" dirty="0"/>
-            </a:br>
-            <a:r>
-              <a:rPr lang="en-US" sz="15000" dirty="0"/>
-              <a:t>🍕 🍕</a:t>
-            </a:r>
-          </a:p>
-        </p:txBody>
-      </p:sp>
+              <a:t>!</a:t>
+            </a:r>
+            <a:endParaRPr lang="en-US" sz="15000" dirty="0"/>
+          </a:p>
+        </p:txBody>
+      </p:sp>
+      <p:pic>
+        <p:nvPicPr>
+          <p:cNvPr id="3" name="Picture 2"/>
+          <p:cNvPicPr>
+            <a:picLocks noChangeAspect="1"/>
+          </p:cNvPicPr>
+          <p:nvPr/>
+        </p:nvPicPr>
+        <p:blipFill>
+          <a:blip r:embed="rId3">
+            <a:extLst>
+              <a:ext uri="{28A0092B-C50C-407E-A947-70E740481C1C}">
+                <a14:useLocalDpi xmlns:a14="http://schemas.microsoft.com/office/drawing/2010/main" val="0"/>
+              </a:ext>
+            </a:extLst>
+          </a:blip>
+          <a:stretch>
+            <a:fillRect/>
+          </a:stretch>
+        </p:blipFill>
+        <p:spPr>
+          <a:xfrm>
+            <a:off x="3892669" y="2589735"/>
+            <a:ext cx="2409276" cy="2409276"/>
+          </a:xfrm>
+          <a:prstGeom prst="rect">
+            <a:avLst/>
+          </a:prstGeom>
+        </p:spPr>
+      </p:pic>
+      <p:pic>
+        <p:nvPicPr>
+          <p:cNvPr id="4" name="Picture 3"/>
+          <p:cNvPicPr>
+            <a:picLocks noChangeAspect="1"/>
+          </p:cNvPicPr>
+          <p:nvPr/>
+        </p:nvPicPr>
+        <p:blipFill>
+          <a:blip r:embed="rId3">
+            <a:extLst>
+              <a:ext uri="{28A0092B-C50C-407E-A947-70E740481C1C}">
+                <a14:useLocalDpi xmlns:a14="http://schemas.microsoft.com/office/drawing/2010/main" val="0"/>
+              </a:ext>
+            </a:extLst>
+          </a:blip>
+          <a:stretch>
+            <a:fillRect/>
+          </a:stretch>
+        </p:blipFill>
+        <p:spPr>
+          <a:xfrm>
+            <a:off x="6331068" y="2640859"/>
+            <a:ext cx="2409276" cy="2409276"/>
+          </a:xfrm>
+          <a:prstGeom prst="rect">
+            <a:avLst/>
+          </a:prstGeom>
+        </p:spPr>
+      </p:pic>
     </p:spTree>
     <p:extLst>
       <p:ext uri="{BB962C8B-B14F-4D97-AF65-F5344CB8AC3E}">
@@ -16298,42 +16344,126 @@
           <a:chExt cx="0" cy="0"/>
         </a:xfrm>
       </p:grpSpPr>
-      <p:sp>
-        <p:nvSpPr>
-          <p:cNvPr id="2" name="Title 1">
+      <p:pic>
+        <p:nvPicPr>
+          <p:cNvPr id="4" name="Picture 3"/>
+          <p:cNvPicPr>
+            <a:picLocks noChangeAspect="1"/>
+          </p:cNvPicPr>
+          <p:nvPr/>
+        </p:nvPicPr>
+        <p:blipFill>
+          <a:blip r:embed="rId3">
             <a:extLst>
-              <a:ext uri="{FF2B5EF4-FFF2-40B4-BE49-F238E27FC236}">
-                <a16:creationId xmlns:a16="http://schemas.microsoft.com/office/drawing/2014/main" id="{C409FD33-6233-7C49-9918-532E7EC05AB5}"/>
+              <a:ext uri="{28A0092B-C50C-407E-A947-70E740481C1C}">
+                <a14:useLocalDpi xmlns:a14="http://schemas.microsoft.com/office/drawing/2010/main" val="0"/>
               </a:ext>
             </a:extLst>
-          </p:cNvPr>
-          <p:cNvSpPr>
-            <a:spLocks noGrp="1"/>
-          </p:cNvSpPr>
-          <p:nvPr>
-            <p:ph type="title"/>
-          </p:nvPr>
-        </p:nvSpPr>
+          </a:blip>
+          <a:stretch>
+            <a:fillRect/>
+          </a:stretch>
+        </p:blipFill>
         <p:spPr>
           <a:xfrm>
-            <a:off x="838200" y="2365324"/>
-            <a:ext cx="10515600" cy="2127352"/>
-          </a:xfrm>
-        </p:spPr>
-        <p:txBody>
-          <a:bodyPr>
-            <a:noAutofit/>
-          </a:bodyPr>
-          <a:lstStyle/>
-          <a:p>
-            <a:pPr algn="ctr"/>
-            <a:r>
-              <a:rPr lang="en-US" sz="20000" dirty="0"/>
-              <a:t>🙍🏽‍♀️🙍🏼‍♂️🙍🏾‍♂️🙍🏻‍♀️</a:t>
-            </a:r>
-          </a:p>
-        </p:txBody>
-      </p:sp>
+            <a:off x="6080667" y="1452280"/>
+            <a:ext cx="2668767" cy="2668767"/>
+          </a:xfrm>
+          <a:prstGeom prst="rect">
+            <a:avLst/>
+          </a:prstGeom>
+        </p:spPr>
+      </p:pic>
+      <p:pic>
+        <p:nvPicPr>
+          <p:cNvPr id="5" name="Picture 4"/>
+          <p:cNvPicPr>
+            <a:picLocks noChangeAspect="1"/>
+          </p:cNvPicPr>
+          <p:nvPr/>
+        </p:nvPicPr>
+        <p:blipFill>
+          <a:blip r:embed="rId4">
+            <a:extLst>
+              <a:ext uri="{28A0092B-C50C-407E-A947-70E740481C1C}">
+                <a14:useLocalDpi xmlns:a14="http://schemas.microsoft.com/office/drawing/2010/main" val="0"/>
+              </a:ext>
+            </a:extLst>
+          </a:blip>
+          <a:stretch>
+            <a:fillRect/>
+          </a:stretch>
+        </p:blipFill>
+        <p:spPr>
+          <a:xfrm>
+            <a:off x="3357490" y="1452280"/>
+            <a:ext cx="2668767" cy="2668767"/>
+          </a:xfrm>
+          <a:prstGeom prst="rect">
+            <a:avLst/>
+          </a:prstGeom>
+        </p:spPr>
+      </p:pic>
+      <p:pic>
+        <p:nvPicPr>
+          <p:cNvPr id="6" name="Picture 5"/>
+          <p:cNvPicPr>
+            <a:picLocks noChangeAspect="1"/>
+          </p:cNvPicPr>
+          <p:nvPr/>
+        </p:nvPicPr>
+        <p:blipFill>
+          <a:blip r:embed="rId5">
+            <a:extLst>
+              <a:ext uri="{28A0092B-C50C-407E-A947-70E740481C1C}">
+                <a14:useLocalDpi xmlns:a14="http://schemas.microsoft.com/office/drawing/2010/main" val="0"/>
+              </a:ext>
+            </a:extLst>
+          </a:blip>
+          <a:stretch>
+            <a:fillRect/>
+          </a:stretch>
+        </p:blipFill>
+        <p:spPr>
+          <a:xfrm>
+            <a:off x="8803843" y="1452280"/>
+            <a:ext cx="2668767" cy="2668767"/>
+          </a:xfrm>
+          <a:prstGeom prst="rect">
+            <a:avLst/>
+          </a:prstGeom>
+        </p:spPr>
+      </p:pic>
+      <p:pic>
+        <p:nvPicPr>
+          <p:cNvPr id="7" name="Picture 6"/>
+          <p:cNvPicPr>
+            <a:picLocks noChangeAspect="1"/>
+          </p:cNvPicPr>
+          <p:nvPr/>
+        </p:nvPicPr>
+        <p:blipFill>
+          <a:blip r:embed="rId6">
+            <a:extLst>
+              <a:ext uri="{28A0092B-C50C-407E-A947-70E740481C1C}">
+                <a14:useLocalDpi xmlns:a14="http://schemas.microsoft.com/office/drawing/2010/main" val="0"/>
+              </a:ext>
+            </a:extLst>
+          </a:blip>
+          <a:stretch>
+            <a:fillRect/>
+          </a:stretch>
+        </p:blipFill>
+        <p:spPr>
+          <a:xfrm>
+            <a:off x="634313" y="1452280"/>
+            <a:ext cx="2668767" cy="2668767"/>
+          </a:xfrm>
+          <a:prstGeom prst="rect">
+            <a:avLst/>
+          </a:prstGeom>
+        </p:spPr>
+      </p:pic>
     </p:spTree>
     <p:extLst>
       <p:ext uri="{BB962C8B-B14F-4D97-AF65-F5344CB8AC3E}">
@@ -16452,6 +16582,66 @@
           </a:p>
         </p:txBody>
       </p:sp>
+      <p:pic>
+        <p:nvPicPr>
+          <p:cNvPr id="4" name="Picture 3"/>
+          <p:cNvPicPr>
+            <a:picLocks noChangeAspect="1"/>
+          </p:cNvPicPr>
+          <p:nvPr/>
+        </p:nvPicPr>
+        <p:blipFill>
+          <a:blip r:embed="rId3">
+            <a:extLst>
+              <a:ext uri="{28A0092B-C50C-407E-A947-70E740481C1C}">
+                <a14:useLocalDpi xmlns:a14="http://schemas.microsoft.com/office/drawing/2010/main" val="0"/>
+              </a:ext>
+            </a:extLst>
+          </a:blip>
+          <a:stretch>
+            <a:fillRect/>
+          </a:stretch>
+        </p:blipFill>
+        <p:spPr>
+          <a:xfrm>
+            <a:off x="6549081" y="278610"/>
+            <a:ext cx="2656411" cy="2656411"/>
+          </a:xfrm>
+          <a:prstGeom prst="rect">
+            <a:avLst/>
+          </a:prstGeom>
+        </p:spPr>
+      </p:pic>
+      <p:pic>
+        <p:nvPicPr>
+          <p:cNvPr id="5" name="Picture 4"/>
+          <p:cNvPicPr>
+            <a:picLocks noChangeAspect="1"/>
+          </p:cNvPicPr>
+          <p:nvPr/>
+        </p:nvPicPr>
+        <p:blipFill>
+          <a:blip r:embed="rId3">
+            <a:extLst>
+              <a:ext uri="{28A0092B-C50C-407E-A947-70E740481C1C}">
+                <a14:useLocalDpi xmlns:a14="http://schemas.microsoft.com/office/drawing/2010/main" val="0"/>
+              </a:ext>
+            </a:extLst>
+          </a:blip>
+          <a:stretch>
+            <a:fillRect/>
+          </a:stretch>
+        </p:blipFill>
+        <p:spPr>
+          <a:xfrm flipH="1">
+            <a:off x="2648465" y="278611"/>
+            <a:ext cx="2656411" cy="2656411"/>
+          </a:xfrm>
+          <a:prstGeom prst="rect">
+            <a:avLst/>
+          </a:prstGeom>
+        </p:spPr>
+      </p:pic>
     </p:spTree>
     <p:extLst>
       <p:ext uri="{BB962C8B-B14F-4D97-AF65-F5344CB8AC3E}">
@@ -16526,6 +16716,126 @@
           </a:p>
         </p:txBody>
       </p:sp>
+      <p:pic>
+        <p:nvPicPr>
+          <p:cNvPr id="4" name="Picture 3"/>
+          <p:cNvPicPr>
+            <a:picLocks noChangeAspect="1"/>
+          </p:cNvPicPr>
+          <p:nvPr/>
+        </p:nvPicPr>
+        <p:blipFill>
+          <a:blip r:embed="rId3">
+            <a:extLst>
+              <a:ext uri="{28A0092B-C50C-407E-A947-70E740481C1C}">
+                <a14:useLocalDpi xmlns:a14="http://schemas.microsoft.com/office/drawing/2010/main" val="0"/>
+              </a:ext>
+            </a:extLst>
+          </a:blip>
+          <a:stretch>
+            <a:fillRect/>
+          </a:stretch>
+        </p:blipFill>
+        <p:spPr>
+          <a:xfrm>
+            <a:off x="1347178" y="277324"/>
+            <a:ext cx="2088000" cy="2088000"/>
+          </a:xfrm>
+          <a:prstGeom prst="rect">
+            <a:avLst/>
+          </a:prstGeom>
+        </p:spPr>
+      </p:pic>
+      <p:pic>
+        <p:nvPicPr>
+          <p:cNvPr id="5" name="Picture 4"/>
+          <p:cNvPicPr>
+            <a:picLocks noChangeAspect="1"/>
+          </p:cNvPicPr>
+          <p:nvPr/>
+        </p:nvPicPr>
+        <p:blipFill>
+          <a:blip r:embed="rId4">
+            <a:extLst>
+              <a:ext uri="{28A0092B-C50C-407E-A947-70E740481C1C}">
+                <a14:useLocalDpi xmlns:a14="http://schemas.microsoft.com/office/drawing/2010/main" val="0"/>
+              </a:ext>
+            </a:extLst>
+          </a:blip>
+          <a:stretch>
+            <a:fillRect/>
+          </a:stretch>
+        </p:blipFill>
+        <p:spPr>
+          <a:xfrm>
+            <a:off x="8946584" y="277324"/>
+            <a:ext cx="2088000" cy="2088000"/>
+          </a:xfrm>
+          <a:prstGeom prst="rect">
+            <a:avLst/>
+          </a:prstGeom>
+        </p:spPr>
+      </p:pic>
+      <p:pic>
+        <p:nvPicPr>
+          <p:cNvPr id="6" name="Picture 5"/>
+          <p:cNvPicPr>
+            <a:picLocks noChangeAspect="1"/>
+          </p:cNvPicPr>
+          <p:nvPr/>
+        </p:nvPicPr>
+        <p:blipFill>
+          <a:blip r:embed="rId5">
+            <a:extLst>
+              <a:ext uri="{28A0092B-C50C-407E-A947-70E740481C1C}">
+                <a14:useLocalDpi xmlns:a14="http://schemas.microsoft.com/office/drawing/2010/main" val="0"/>
+              </a:ext>
+            </a:extLst>
+          </a:blip>
+          <a:stretch>
+            <a:fillRect/>
+          </a:stretch>
+        </p:blipFill>
+        <p:spPr>
+          <a:xfrm>
+            <a:off x="1347178" y="4213010"/>
+            <a:ext cx="2088000" cy="2088000"/>
+          </a:xfrm>
+          <a:prstGeom prst="rect">
+            <a:avLst/>
+          </a:prstGeom>
+        </p:spPr>
+      </p:pic>
+      <p:pic>
+        <p:nvPicPr>
+          <p:cNvPr id="7" name="Picture 6"/>
+          <p:cNvPicPr>
+            <a:picLocks noChangeAspect="1"/>
+          </p:cNvPicPr>
+          <p:nvPr/>
+        </p:nvPicPr>
+        <p:blipFill>
+          <a:blip r:embed="rId6">
+            <a:extLst>
+              <a:ext uri="{28A0092B-C50C-407E-A947-70E740481C1C}">
+                <a14:useLocalDpi xmlns:a14="http://schemas.microsoft.com/office/drawing/2010/main" val="0"/>
+              </a:ext>
+            </a:extLst>
+          </a:blip>
+          <a:stretch>
+            <a:fillRect/>
+          </a:stretch>
+        </p:blipFill>
+        <p:spPr>
+          <a:xfrm>
+            <a:off x="8946584" y="4213010"/>
+            <a:ext cx="2088000" cy="2088000"/>
+          </a:xfrm>
+          <a:prstGeom prst="rect">
+            <a:avLst/>
+          </a:prstGeom>
+        </p:spPr>
+      </p:pic>
     </p:spTree>
     <p:extLst>
       <p:ext uri="{BB962C8B-B14F-4D97-AF65-F5344CB8AC3E}">
@@ -16582,7 +16892,7 @@
         </p:nvSpPr>
         <p:spPr>
           <a:xfrm>
-            <a:off x="838200" y="2365324"/>
+            <a:off x="875562" y="771303"/>
             <a:ext cx="10515600" cy="2127352"/>
           </a:xfrm>
         </p:spPr>
@@ -16600,6 +16910,36 @@
           </a:p>
         </p:txBody>
       </p:sp>
+      <p:pic>
+        <p:nvPicPr>
+          <p:cNvPr id="3" name="Picture 2"/>
+          <p:cNvPicPr>
+            <a:picLocks noChangeAspect="1"/>
+          </p:cNvPicPr>
+          <p:nvPr/>
+        </p:nvPicPr>
+        <p:blipFill>
+          <a:blip r:embed="rId3">
+            <a:extLst>
+              <a:ext uri="{28A0092B-C50C-407E-A947-70E740481C1C}">
+                <a14:useLocalDpi xmlns:a14="http://schemas.microsoft.com/office/drawing/2010/main" val="0"/>
+              </a:ext>
+            </a:extLst>
+          </a:blip>
+          <a:stretch>
+            <a:fillRect/>
+          </a:stretch>
+        </p:blipFill>
+        <p:spPr>
+          <a:xfrm>
+            <a:off x="4743372" y="3103897"/>
+            <a:ext cx="2779979" cy="2779979"/>
+          </a:xfrm>
+          <a:prstGeom prst="rect">
+            <a:avLst/>
+          </a:prstGeom>
+        </p:spPr>
+      </p:pic>
     </p:spTree>
     <p:extLst>
       <p:ext uri="{BB962C8B-B14F-4D97-AF65-F5344CB8AC3E}">
@@ -16891,7 +17231,7 @@
             <a:pPr algn="ctr"/>
             <a:r>
               <a:rPr lang="en-US" sz="6600" dirty="0"/>
-              <a:t>SIGs = Great Places to embed Enterprise Architects</a:t>
+              <a:t>What about the “Architecture Review Board”?</a:t>
             </a:r>
           </a:p>
         </p:txBody>
@@ -16899,7 +17239,7 @@
     </p:spTree>
     <p:extLst>
       <p:ext uri="{BB962C8B-B14F-4D97-AF65-F5344CB8AC3E}">
-        <p14:creationId xmlns:p14="http://schemas.microsoft.com/office/powerpoint/2010/main" val="139522922"/>
+        <p14:creationId xmlns:p14="http://schemas.microsoft.com/office/powerpoint/2010/main" val="3151097888"/>
       </p:ext>
     </p:extLst>
   </p:cSld>
@@ -16952,7 +17292,7 @@
         </p:nvSpPr>
         <p:spPr>
           <a:xfrm>
-            <a:off x="838200" y="2365324"/>
+            <a:off x="838200" y="684805"/>
             <a:ext cx="10515600" cy="2127352"/>
           </a:xfrm>
         </p:spPr>
@@ -16971,6 +17311,36 @@
           </a:p>
         </p:txBody>
       </p:sp>
+      <p:pic>
+        <p:nvPicPr>
+          <p:cNvPr id="3" name="Picture 2"/>
+          <p:cNvPicPr>
+            <a:picLocks noChangeAspect="1"/>
+          </p:cNvPicPr>
+          <p:nvPr/>
+        </p:nvPicPr>
+        <p:blipFill>
+          <a:blip r:embed="rId3">
+            <a:extLst>
+              <a:ext uri="{28A0092B-C50C-407E-A947-70E740481C1C}">
+                <a14:useLocalDpi xmlns:a14="http://schemas.microsoft.com/office/drawing/2010/main" val="0"/>
+              </a:ext>
+            </a:extLst>
+          </a:blip>
+          <a:stretch>
+            <a:fillRect/>
+          </a:stretch>
+        </p:blipFill>
+        <p:spPr>
+          <a:xfrm>
+            <a:off x="5070535" y="3363389"/>
+            <a:ext cx="2050930" cy="2050930"/>
+          </a:xfrm>
+          <a:prstGeom prst="rect">
+            <a:avLst/>
+          </a:prstGeom>
+        </p:spPr>
+      </p:pic>
     </p:spTree>
     <p:extLst>
       <p:ext uri="{BB962C8B-B14F-4D97-AF65-F5344CB8AC3E}">
@@ -17040,7 +17410,7 @@
             <a:pPr algn="ctr"/>
             <a:r>
               <a:rPr lang="en-US" sz="6600" dirty="0"/>
-              <a:t>What about the “Architecture Review Board”?</a:t>
+              <a:t>The Guild helped with one of the hardest problems: Socializing Decisions</a:t>
             </a:r>
           </a:p>
         </p:txBody>
@@ -17048,7 +17418,7 @@
     </p:spTree>
     <p:extLst>
       <p:ext uri="{BB962C8B-B14F-4D97-AF65-F5344CB8AC3E}">
-        <p14:creationId xmlns:p14="http://schemas.microsoft.com/office/powerpoint/2010/main" val="3151097888"/>
+        <p14:creationId xmlns:p14="http://schemas.microsoft.com/office/powerpoint/2010/main" val="468891399"/>
       </p:ext>
     </p:extLst>
   </p:cSld>
@@ -17114,80 +17484,6 @@
             <a:pPr algn="ctr"/>
             <a:r>
               <a:rPr lang="en-US" sz="6600" dirty="0"/>
-              <a:t>The Guild helped with one of the hardest problems: Socializing Decisions</a:t>
-            </a:r>
-          </a:p>
-        </p:txBody>
-      </p:sp>
-    </p:spTree>
-    <p:extLst>
-      <p:ext uri="{BB962C8B-B14F-4D97-AF65-F5344CB8AC3E}">
-        <p14:creationId xmlns:p14="http://schemas.microsoft.com/office/powerpoint/2010/main" val="468891399"/>
-      </p:ext>
-    </p:extLst>
-  </p:cSld>
-  <p:clrMapOvr>
-    <a:masterClrMapping/>
-  </p:clrMapOvr>
-</p:sld>
-</file>
-
-<file path=ppt/slides/slide52.xml><?xml version="1.0" encoding="utf-8"?>
-<p:sld xmlns:a="http://schemas.openxmlformats.org/drawingml/2006/main" xmlns:r="http://schemas.openxmlformats.org/officeDocument/2006/relationships" xmlns:p="http://schemas.openxmlformats.org/presentationml/2006/main">
-  <p:cSld>
-    <p:bg>
-      <p:bgPr>
-        <a:solidFill>
-          <a:schemeClr val="accent5"/>
-        </a:solidFill>
-        <a:effectLst/>
-      </p:bgPr>
-    </p:bg>
-    <p:spTree>
-      <p:nvGrpSpPr>
-        <p:cNvPr id="1" name=""/>
-        <p:cNvGrpSpPr/>
-        <p:nvPr/>
-      </p:nvGrpSpPr>
-      <p:grpSpPr>
-        <a:xfrm>
-          <a:off x="0" y="0"/>
-          <a:ext cx="0" cy="0"/>
-          <a:chOff x="0" y="0"/>
-          <a:chExt cx="0" cy="0"/>
-        </a:xfrm>
-      </p:grpSpPr>
-      <p:sp>
-        <p:nvSpPr>
-          <p:cNvPr id="2" name="Title 1">
-            <a:extLst>
-              <a:ext uri="{FF2B5EF4-FFF2-40B4-BE49-F238E27FC236}">
-                <a16:creationId xmlns:a16="http://schemas.microsoft.com/office/drawing/2014/main" id="{C409FD33-6233-7C49-9918-532E7EC05AB5}"/>
-              </a:ext>
-            </a:extLst>
-          </p:cNvPr>
-          <p:cNvSpPr>
-            <a:spLocks noGrp="1"/>
-          </p:cNvSpPr>
-          <p:nvPr>
-            <p:ph type="title"/>
-          </p:nvPr>
-        </p:nvSpPr>
-        <p:spPr>
-          <a:xfrm>
-            <a:off x="838200" y="2365324"/>
-            <a:ext cx="10515600" cy="2127352"/>
-          </a:xfrm>
-        </p:spPr>
-        <p:txBody>
-          <a:bodyPr>
-            <a:noAutofit/>
-          </a:bodyPr>
-          <a:lstStyle/>
-          <a:p>
-            <a:pPr algn="ctr"/>
-            <a:r>
-              <a:rPr lang="en-US" sz="6600" dirty="0"/>
               <a:t>What did these meetings look like?</a:t>
             </a:r>
           </a:p>
@@ -17206,7 +17502,7 @@
 </p:sld>
 </file>
 
-<file path=ppt/slides/slide53.xml><?xml version="1.0" encoding="utf-8"?>
+<file path=ppt/slides/slide52.xml><?xml version="1.0" encoding="utf-8"?>
 <p:sld xmlns:a="http://schemas.openxmlformats.org/drawingml/2006/main" xmlns:r="http://schemas.openxmlformats.org/officeDocument/2006/relationships" xmlns:p="http://schemas.openxmlformats.org/presentationml/2006/main">
   <p:cSld>
     <p:bg>
@@ -17545,7 +17841,7 @@
 </p:sld>
 </file>
 
-<file path=ppt/slides/slide54.xml><?xml version="1.0" encoding="utf-8"?>
+<file path=ppt/slides/slide53.xml><?xml version="1.0" encoding="utf-8"?>
 <p:sld xmlns:a="http://schemas.openxmlformats.org/drawingml/2006/main" xmlns:r="http://schemas.openxmlformats.org/officeDocument/2006/relationships" xmlns:p="http://schemas.openxmlformats.org/presentationml/2006/main">
   <p:cSld>
     <p:bg>
@@ -17671,7 +17967,7 @@
 </p:sld>
 </file>
 
-<file path=ppt/slides/slide55.xml><?xml version="1.0" encoding="utf-8"?>
+<file path=ppt/slides/slide54.xml><?xml version="1.0" encoding="utf-8"?>
 <p:sld xmlns:a="http://schemas.openxmlformats.org/drawingml/2006/main" xmlns:r="http://schemas.openxmlformats.org/officeDocument/2006/relationships" xmlns:p="http://schemas.openxmlformats.org/presentationml/2006/main">
   <p:cSld>
     <p:bg>
@@ -18055,6 +18351,92 @@
 </p:sld>
 </file>
 
+<file path=ppt/slides/slide55.xml><?xml version="1.0" encoding="utf-8"?>
+<p:sld xmlns:a="http://schemas.openxmlformats.org/drawingml/2006/main" xmlns:r="http://schemas.openxmlformats.org/officeDocument/2006/relationships" xmlns:p="http://schemas.openxmlformats.org/presentationml/2006/main">
+  <p:cSld>
+    <p:bg>
+      <p:bgPr>
+        <a:solidFill>
+          <a:schemeClr val="accent5"/>
+        </a:solidFill>
+        <a:effectLst/>
+      </p:bgPr>
+    </p:bg>
+    <p:spTree>
+      <p:nvGrpSpPr>
+        <p:cNvPr id="1" name=""/>
+        <p:cNvGrpSpPr/>
+        <p:nvPr/>
+      </p:nvGrpSpPr>
+      <p:grpSpPr>
+        <a:xfrm>
+          <a:off x="0" y="0"/>
+          <a:ext cx="0" cy="0"/>
+          <a:chOff x="0" y="0"/>
+          <a:chExt cx="0" cy="0"/>
+        </a:xfrm>
+      </p:grpSpPr>
+      <p:sp>
+        <p:nvSpPr>
+          <p:cNvPr id="2" name="Title 1">
+            <a:extLst>
+              <a:ext uri="{FF2B5EF4-FFF2-40B4-BE49-F238E27FC236}">
+                <a16:creationId xmlns:a16="http://schemas.microsoft.com/office/drawing/2014/main" id="{C409FD33-6233-7C49-9918-532E7EC05AB5}"/>
+              </a:ext>
+            </a:extLst>
+          </p:cNvPr>
+          <p:cNvSpPr>
+            <a:spLocks noGrp="1"/>
+          </p:cNvSpPr>
+          <p:nvPr>
+            <p:ph type="title"/>
+          </p:nvPr>
+        </p:nvSpPr>
+        <p:spPr>
+          <a:xfrm>
+            <a:off x="838200" y="2365324"/>
+            <a:ext cx="10515600" cy="2127352"/>
+          </a:xfrm>
+        </p:spPr>
+        <p:txBody>
+          <a:bodyPr>
+            <a:noAutofit/>
+          </a:bodyPr>
+          <a:lstStyle/>
+          <a:p>
+            <a:pPr algn="ctr"/>
+            <a:r>
+              <a:rPr lang="en-US" sz="6600" dirty="0"/>
+              <a:t>Complex Environment?</a:t>
+            </a:r>
+            <a:br>
+              <a:rPr lang="en-US" sz="6600" dirty="0"/>
+            </a:br>
+            <a:r>
+              <a:rPr lang="en-US" sz="6600" dirty="0"/>
+              <a:t>You </a:t>
+            </a:r>
+            <a:r>
+              <a:rPr lang="en-US" sz="6600" dirty="0" err="1"/>
+              <a:t>betcha</a:t>
+            </a:r>
+            <a:endParaRPr lang="en-US" sz="6600" dirty="0"/>
+          </a:p>
+        </p:txBody>
+      </p:sp>
+    </p:spTree>
+    <p:extLst>
+      <p:ext uri="{BB962C8B-B14F-4D97-AF65-F5344CB8AC3E}">
+        <p14:creationId xmlns:p14="http://schemas.microsoft.com/office/powerpoint/2010/main" val="3759570375"/>
+      </p:ext>
+    </p:extLst>
+  </p:cSld>
+  <p:clrMapOvr>
+    <a:masterClrMapping/>
+  </p:clrMapOvr>
+</p:sld>
+</file>
+
 <file path=ppt/slides/slide56.xml><?xml version="1.0" encoding="utf-8"?>
 <p:sld xmlns:a="http://schemas.openxmlformats.org/drawingml/2006/main" xmlns:r="http://schemas.openxmlformats.org/officeDocument/2006/relationships" xmlns:p="http://schemas.openxmlformats.org/presentationml/2006/main">
   <p:cSld>
@@ -18111,27 +18493,15 @@
             <a:pPr algn="ctr"/>
             <a:r>
               <a:rPr lang="en-US" sz="6600" dirty="0"/>
-              <a:t>Complex Environment?</a:t>
-            </a:r>
-            <a:br>
-              <a:rPr lang="en-US" sz="6600" dirty="0"/>
-            </a:br>
-            <a:r>
-              <a:rPr lang="en-US" sz="6600" dirty="0"/>
-              <a:t>You </a:t>
-            </a:r>
-            <a:r>
-              <a:rPr lang="en-US" sz="6600" dirty="0" err="1"/>
-              <a:t>betcha</a:t>
-            </a:r>
-            <a:endParaRPr lang="en-US" sz="6600" dirty="0"/>
+              <a:t>Reference Application Baked In Best Practices</a:t>
+            </a:r>
           </a:p>
         </p:txBody>
       </p:sp>
     </p:spTree>
     <p:extLst>
       <p:ext uri="{BB962C8B-B14F-4D97-AF65-F5344CB8AC3E}">
-        <p14:creationId xmlns:p14="http://schemas.microsoft.com/office/powerpoint/2010/main" val="3759570375"/>
+        <p14:creationId xmlns:p14="http://schemas.microsoft.com/office/powerpoint/2010/main" val="3653919622"/>
       </p:ext>
     </p:extLst>
   </p:cSld>
@@ -18197,7 +18567,7 @@
             <a:pPr algn="ctr"/>
             <a:r>
               <a:rPr lang="en-US" sz="6600" dirty="0"/>
-              <a:t>Reference Application Baked In Best Practices</a:t>
+              <a:t>Linting Rules</a:t>
             </a:r>
           </a:p>
         </p:txBody>
@@ -18205,7 +18575,7 @@
     </p:spTree>
     <p:extLst>
       <p:ext uri="{BB962C8B-B14F-4D97-AF65-F5344CB8AC3E}">
-        <p14:creationId xmlns:p14="http://schemas.microsoft.com/office/powerpoint/2010/main" val="3653919622"/>
+        <p14:creationId xmlns:p14="http://schemas.microsoft.com/office/powerpoint/2010/main" val="2286172921"/>
       </p:ext>
     </p:extLst>
   </p:cSld>
@@ -18271,7 +18641,7 @@
             <a:pPr algn="ctr"/>
             <a:r>
               <a:rPr lang="en-US" sz="6600" dirty="0"/>
-              <a:t>Linting Rules</a:t>
+              <a:t>Static Code Analysis</a:t>
             </a:r>
           </a:p>
         </p:txBody>
@@ -18279,7 +18649,7 @@
     </p:spTree>
     <p:extLst>
       <p:ext uri="{BB962C8B-B14F-4D97-AF65-F5344CB8AC3E}">
-        <p14:creationId xmlns:p14="http://schemas.microsoft.com/office/powerpoint/2010/main" val="2286172921"/>
+        <p14:creationId xmlns:p14="http://schemas.microsoft.com/office/powerpoint/2010/main" val="406180384"/>
       </p:ext>
     </p:extLst>
   </p:cSld>
@@ -18345,7 +18715,7 @@
             <a:pPr algn="ctr"/>
             <a:r>
               <a:rPr lang="en-US" sz="6600" dirty="0"/>
-              <a:t>Static Code Analysis</a:t>
+              <a:t>Security</a:t>
             </a:r>
           </a:p>
         </p:txBody>
@@ -18353,7 +18723,7 @@
     </p:spTree>
     <p:extLst>
       <p:ext uri="{BB962C8B-B14F-4D97-AF65-F5344CB8AC3E}">
-        <p14:creationId xmlns:p14="http://schemas.microsoft.com/office/powerpoint/2010/main" val="406180384"/>
+        <p14:creationId xmlns:p14="http://schemas.microsoft.com/office/powerpoint/2010/main" val="2508319854"/>
       </p:ext>
     </p:extLst>
   </p:cSld>
@@ -18541,7 +18911,7 @@
             <a:pPr algn="ctr"/>
             <a:r>
               <a:rPr lang="en-US" sz="6600" dirty="0"/>
-              <a:t>Security</a:t>
+              <a:t>Everything you need to get started just writing code</a:t>
             </a:r>
           </a:p>
         </p:txBody>
@@ -18549,7 +18919,7 @@
     </p:spTree>
     <p:extLst>
       <p:ext uri="{BB962C8B-B14F-4D97-AF65-F5344CB8AC3E}">
-        <p14:creationId xmlns:p14="http://schemas.microsoft.com/office/powerpoint/2010/main" val="2508319854"/>
+        <p14:creationId xmlns:p14="http://schemas.microsoft.com/office/powerpoint/2010/main" val="1405293278"/>
       </p:ext>
     </p:extLst>
   </p:cSld>
@@ -18615,7 +18985,7 @@
             <a:pPr algn="ctr"/>
             <a:r>
               <a:rPr lang="en-US" sz="6600" dirty="0"/>
-              <a:t>Everything you need to get started just writing code</a:t>
+              <a:t>Did It Work?</a:t>
             </a:r>
           </a:p>
         </p:txBody>
@@ -18623,7 +18993,7 @@
     </p:spTree>
     <p:extLst>
       <p:ext uri="{BB962C8B-B14F-4D97-AF65-F5344CB8AC3E}">
-        <p14:creationId xmlns:p14="http://schemas.microsoft.com/office/powerpoint/2010/main" val="1405293278"/>
+        <p14:creationId xmlns:p14="http://schemas.microsoft.com/office/powerpoint/2010/main" val="1864778523"/>
       </p:ext>
     </p:extLst>
   </p:cSld>
@@ -18689,7 +19059,14 @@
             <a:pPr algn="ctr"/>
             <a:r>
               <a:rPr lang="en-US" sz="6600" dirty="0"/>
-              <a:t>Did It Work?</a:t>
+              <a:t>Other Reference</a:t>
+            </a:r>
+            <a:br>
+              <a:rPr lang="en-US" sz="6600" dirty="0"/>
+            </a:br>
+            <a:r>
+              <a:rPr lang="en-US" sz="6600" dirty="0"/>
+              <a:t>Implementations</a:t>
             </a:r>
           </a:p>
         </p:txBody>
@@ -18697,7 +19074,7 @@
     </p:spTree>
     <p:extLst>
       <p:ext uri="{BB962C8B-B14F-4D97-AF65-F5344CB8AC3E}">
-        <p14:creationId xmlns:p14="http://schemas.microsoft.com/office/powerpoint/2010/main" val="1864778523"/>
+        <p14:creationId xmlns:p14="http://schemas.microsoft.com/office/powerpoint/2010/main" val="1431407279"/>
       </p:ext>
     </p:extLst>
   </p:cSld>
@@ -18763,14 +19140,14 @@
             <a:pPr algn="ctr"/>
             <a:r>
               <a:rPr lang="en-US" sz="6600" dirty="0"/>
-              <a:t>Other Reference</a:t>
+              <a:t>Implicit Commitment</a:t>
             </a:r>
             <a:br>
               <a:rPr lang="en-US" sz="6600" dirty="0"/>
             </a:br>
             <a:r>
               <a:rPr lang="en-US" sz="6600" dirty="0"/>
-              <a:t>Implementations</a:t>
+              <a:t>to Maintain</a:t>
             </a:r>
           </a:p>
         </p:txBody>
@@ -18778,7 +19155,7 @@
     </p:spTree>
     <p:extLst>
       <p:ext uri="{BB962C8B-B14F-4D97-AF65-F5344CB8AC3E}">
-        <p14:creationId xmlns:p14="http://schemas.microsoft.com/office/powerpoint/2010/main" val="1431407279"/>
+        <p14:creationId xmlns:p14="http://schemas.microsoft.com/office/powerpoint/2010/main" val="2486915822"/>
       </p:ext>
     </p:extLst>
   </p:cSld>
@@ -18844,14 +19221,7 @@
             <a:pPr algn="ctr"/>
             <a:r>
               <a:rPr lang="en-US" sz="6600" dirty="0"/>
-              <a:t>Implicit Commitment</a:t>
-            </a:r>
-            <a:br>
-              <a:rPr lang="en-US" sz="6600" dirty="0"/>
-            </a:br>
-            <a:r>
-              <a:rPr lang="en-US" sz="6600" dirty="0"/>
-              <a:t>to Maintain</a:t>
+              <a:t>Well Worth the Effort</a:t>
             </a:r>
           </a:p>
         </p:txBody>
@@ -18859,7 +19229,7 @@
     </p:spTree>
     <p:extLst>
       <p:ext uri="{BB962C8B-B14F-4D97-AF65-F5344CB8AC3E}">
-        <p14:creationId xmlns:p14="http://schemas.microsoft.com/office/powerpoint/2010/main" val="2486915822"/>
+        <p14:creationId xmlns:p14="http://schemas.microsoft.com/office/powerpoint/2010/main" val="783352059"/>
       </p:ext>
     </p:extLst>
   </p:cSld>
@@ -18925,15 +19295,35 @@
             <a:pPr algn="ctr"/>
             <a:r>
               <a:rPr lang="en-US" sz="6600" dirty="0"/>
-              <a:t>Well Worth the Effort</a:t>
-            </a:r>
+              <a:t>Bonus </a:t>
+            </a:r>
+            <a:r>
+              <a:rPr lang="en-US" sz="6600" dirty="0" smtClean="0"/>
+              <a:t>Technique</a:t>
+            </a:r>
+            <a:r>
+              <a:rPr lang="en-US" sz="6600" dirty="0"/>
+              <a:t>: </a:t>
+            </a:r>
+            <a:r>
+              <a:rPr lang="en-US" sz="6600" dirty="0" smtClean="0"/>
+              <a:t/>
+            </a:r>
+            <a:br>
+              <a:rPr lang="en-US" sz="6600" dirty="0" smtClean="0"/>
+            </a:br>
+            <a:r>
+              <a:rPr lang="en-US" sz="6600" dirty="0" smtClean="0"/>
+              <a:t>Tracer Bullet/Steel Thread</a:t>
+            </a:r>
+            <a:endParaRPr lang="en-US" sz="6600" dirty="0"/>
           </a:p>
         </p:txBody>
       </p:sp>
     </p:spTree>
     <p:extLst>
       <p:ext uri="{BB962C8B-B14F-4D97-AF65-F5344CB8AC3E}">
-        <p14:creationId xmlns:p14="http://schemas.microsoft.com/office/powerpoint/2010/main" val="783352059"/>
+        <p14:creationId xmlns:p14="http://schemas.microsoft.com/office/powerpoint/2010/main" val="3985096481"/>
       </p:ext>
     </p:extLst>
   </p:cSld>
@@ -18949,7 +19339,7 @@
     <p:bg>
       <p:bgPr>
         <a:solidFill>
-          <a:schemeClr val="accent5"/>
+          <a:schemeClr val="accent1"/>
         </a:solidFill>
         <a:effectLst/>
       </p:bgPr>
@@ -18998,36 +19388,20 @@
           <a:p>
             <a:pPr algn="ctr"/>
             <a:r>
-              <a:rPr lang="en-US" sz="6600" dirty="0"/>
-              <a:t>Bonus </a:t>
-            </a:r>
-            <a:r>
-              <a:rPr lang="en-US" sz="6600" dirty="0" smtClean="0"/>
-              <a:t>Technique</a:t>
-            </a:r>
-            <a:r>
-              <a:rPr lang="en-US" sz="6600" dirty="0"/>
-              <a:t>: </a:t>
-            </a:r>
-            <a:r>
-              <a:rPr lang="en-US" sz="6600" dirty="0" smtClean="0"/>
-              <a:t/>
-            </a:r>
-            <a:br>
-              <a:rPr lang="en-US" sz="6600" dirty="0" smtClean="0"/>
-            </a:br>
-            <a:r>
-              <a:rPr lang="en-US" sz="6600" dirty="0" smtClean="0"/>
-              <a:t>Tracer Bullet/Steel Thread</a:t>
-            </a:r>
-            <a:endParaRPr lang="en-US" sz="6600" dirty="0"/>
+              <a:rPr lang="en-US" sz="6600" dirty="0">
+                <a:solidFill>
+                  <a:schemeClr val="bg1"/>
+                </a:solidFill>
+              </a:rPr>
+              <a:t>Thanks for your time!</a:t>
+            </a:r>
           </a:p>
         </p:txBody>
       </p:sp>
     </p:spTree>
     <p:extLst>
       <p:ext uri="{BB962C8B-B14F-4D97-AF65-F5344CB8AC3E}">
-        <p14:creationId xmlns:p14="http://schemas.microsoft.com/office/powerpoint/2010/main" val="3985096481"/>
+        <p14:creationId xmlns:p14="http://schemas.microsoft.com/office/powerpoint/2010/main" val="4023227224"/>
       </p:ext>
     </p:extLst>
   </p:cSld>
@@ -19067,84 +19441,6 @@
           <p:cNvPr id="2" name="Title 1">
             <a:extLst>
               <a:ext uri="{FF2B5EF4-FFF2-40B4-BE49-F238E27FC236}">
-                <a16:creationId xmlns:a16="http://schemas.microsoft.com/office/drawing/2014/main" id="{C409FD33-6233-7C49-9918-532E7EC05AB5}"/>
-              </a:ext>
-            </a:extLst>
-          </p:cNvPr>
-          <p:cNvSpPr>
-            <a:spLocks noGrp="1"/>
-          </p:cNvSpPr>
-          <p:nvPr>
-            <p:ph type="title"/>
-          </p:nvPr>
-        </p:nvSpPr>
-        <p:spPr>
-          <a:xfrm>
-            <a:off x="838200" y="2365324"/>
-            <a:ext cx="10515600" cy="2127352"/>
-          </a:xfrm>
-        </p:spPr>
-        <p:txBody>
-          <a:bodyPr>
-            <a:noAutofit/>
-          </a:bodyPr>
-          <a:lstStyle/>
-          <a:p>
-            <a:pPr algn="ctr"/>
-            <a:r>
-              <a:rPr lang="en-US" sz="6600" dirty="0">
-                <a:solidFill>
-                  <a:schemeClr val="bg1"/>
-                </a:solidFill>
-              </a:rPr>
-              <a:t>Thanks for your time!</a:t>
-            </a:r>
-          </a:p>
-        </p:txBody>
-      </p:sp>
-    </p:spTree>
-    <p:extLst>
-      <p:ext uri="{BB962C8B-B14F-4D97-AF65-F5344CB8AC3E}">
-        <p14:creationId xmlns:p14="http://schemas.microsoft.com/office/powerpoint/2010/main" val="4023227224"/>
-      </p:ext>
-    </p:extLst>
-  </p:cSld>
-  <p:clrMapOvr>
-    <a:masterClrMapping/>
-  </p:clrMapOvr>
-</p:sld>
-</file>
-
-<file path=ppt/slides/slide68.xml><?xml version="1.0" encoding="utf-8"?>
-<p:sld xmlns:a="http://schemas.openxmlformats.org/drawingml/2006/main" xmlns:r="http://schemas.openxmlformats.org/officeDocument/2006/relationships" xmlns:p="http://schemas.openxmlformats.org/presentationml/2006/main">
-  <p:cSld>
-    <p:bg>
-      <p:bgPr>
-        <a:solidFill>
-          <a:schemeClr val="accent1"/>
-        </a:solidFill>
-        <a:effectLst/>
-      </p:bgPr>
-    </p:bg>
-    <p:spTree>
-      <p:nvGrpSpPr>
-        <p:cNvPr id="1" name=""/>
-        <p:cNvGrpSpPr/>
-        <p:nvPr/>
-      </p:nvGrpSpPr>
-      <p:grpSpPr>
-        <a:xfrm>
-          <a:off x="0" y="0"/>
-          <a:ext cx="0" cy="0"/>
-          <a:chOff x="0" y="0"/>
-          <a:chExt cx="0" cy="0"/>
-        </a:xfrm>
-      </p:grpSpPr>
-      <p:sp>
-        <p:nvSpPr>
-          <p:cNvPr id="2" name="Title 1">
-            <a:extLst>
-              <a:ext uri="{FF2B5EF4-FFF2-40B4-BE49-F238E27FC236}">
                 <a16:creationId xmlns:a16="http://schemas.microsoft.com/office/drawing/2014/main" id="{B7EDD339-25E7-4C48-B5BA-12942D464698}"/>
               </a:ext>
             </a:extLst>
@@ -19171,11 +19467,6 @@
               </a:rPr>
               <a:t>Communicating and Documenting Architectural Decisions</a:t>
             </a:r>
-            <a:endParaRPr lang="en-US" dirty="0">
-              <a:solidFill>
-                <a:schemeClr val="bg1"/>
-              </a:solidFill>
-            </a:endParaRPr>
           </a:p>
         </p:txBody>
       </p:sp>
@@ -19203,17 +19494,32 @@
         </p:spPr>
         <p:txBody>
           <a:bodyPr>
-            <a:normAutofit fontScale="92500"/>
+            <a:normAutofit fontScale="85000" lnSpcReduction="20000"/>
           </a:bodyPr>
           <a:lstStyle/>
           <a:p>
+            <a:endParaRPr lang="en-US" sz="3200" dirty="0" smtClean="0">
+              <a:solidFill>
+                <a:schemeClr val="bg1"/>
+              </a:solidFill>
+            </a:endParaRPr>
+          </a:p>
+          <a:p>
+            <a:r>
+              <a:rPr lang="en-US" sz="3200" dirty="0" smtClean="0">
+                <a:solidFill>
+                  <a:schemeClr val="bg1"/>
+                </a:solidFill>
+              </a:rPr>
+              <a:t>David </a:t>
+            </a:r>
             <a:r>
               <a:rPr lang="en-US" sz="3200" dirty="0">
                 <a:solidFill>
                   <a:schemeClr val="bg1"/>
                 </a:solidFill>
               </a:rPr>
-              <a:t>David Ayers, Group VP of Technology, Leslie’s </a:t>
+              <a:t>Ayers, Group VP of Technology, Leslie’s </a:t>
             </a:r>
             <a:r>
               <a:rPr lang="en-US" sz="3200" dirty="0" err="1">
@@ -19231,13 +19537,18 @@
           </a:p>
           <a:p>
             <a:r>
-              <a:rPr lang="en-US" sz="3200" dirty="0">
+              <a:rPr lang="en-US" sz="3200" dirty="0" smtClean="0">
                 <a:solidFill>
                   <a:schemeClr val="bg1"/>
                 </a:solidFill>
               </a:rPr>
-              <a:t>dayers@lesl.com</a:t>
-            </a:r>
+              <a:t>david.a.ayers@gmail.com</a:t>
+            </a:r>
+            <a:endParaRPr lang="en-US" sz="3200" dirty="0">
+              <a:solidFill>
+                <a:schemeClr val="bg1"/>
+              </a:solidFill>
+            </a:endParaRPr>
           </a:p>
           <a:p>
             <a:r>
@@ -19261,6 +19572,40 @@
                 <a:schemeClr val="bg1"/>
               </a:solidFill>
             </a:endParaRPr>
+          </a:p>
+        </p:txBody>
+      </p:sp>
+      <p:sp>
+        <p:nvSpPr>
+          <p:cNvPr id="4" name="TextBox 3"/>
+          <p:cNvSpPr txBox="1"/>
+          <p:nvPr/>
+        </p:nvSpPr>
+        <p:spPr>
+          <a:xfrm>
+            <a:off x="1779373" y="4102443"/>
+            <a:ext cx="8699156" cy="461665"/>
+          </a:xfrm>
+          <a:prstGeom prst="rect">
+            <a:avLst/>
+          </a:prstGeom>
+          <a:noFill/>
+        </p:spPr>
+        <p:txBody>
+          <a:bodyPr wrap="square" rtlCol="0">
+            <a:spAutoFit/>
+          </a:bodyPr>
+          <a:lstStyle/>
+          <a:p>
+            <a:pPr algn="ctr"/>
+            <a:r>
+              <a:rPr lang="en-US" sz="2400" dirty="0">
+                <a:solidFill>
+                  <a:schemeClr val="bg1"/>
+                </a:solidFill>
+              </a:rPr>
+              <a:t>https://github.com/davidaayers/comm-and-doc-arch-decisions</a:t>
+            </a:r>
           </a:p>
         </p:txBody>
       </p:sp>
@@ -19503,11 +19848,6 @@
               </a:rPr>
               <a:t>it this way?”</a:t>
             </a:r>
-            <a:endParaRPr lang="en-US" sz="6600" i="1" dirty="0">
-              <a:solidFill>
-                <a:schemeClr val="bg1"/>
-              </a:solidFill>
-            </a:endParaRPr>
           </a:p>
         </p:txBody>
       </p:sp>
@@ -19546,21 +19886,8 @@
                   <a:schemeClr val="bg1"/>
                 </a:solidFill>
               </a:rPr>
-              <a:t>-- </a:t>
-            </a:r>
-            <a:r>
-              <a:rPr lang="en-US" sz="2400" dirty="0">
-                <a:solidFill>
-                  <a:schemeClr val="bg1"/>
-                </a:solidFill>
-              </a:rPr>
-              <a:t>Every developer in history, twelve months after making a decision</a:t>
-            </a:r>
-            <a:endParaRPr lang="en-US" sz="2400" dirty="0">
-              <a:solidFill>
-                <a:schemeClr val="bg1"/>
-              </a:solidFill>
-            </a:endParaRPr>
+              <a:t>-- Every developer in history, twelve months after making a decision</a:t>
+            </a:r>
           </a:p>
         </p:txBody>
       </p:sp>

</xml_diff>